<commit_message>
Handout and Poster Update
</commit_message>
<xml_diff>
--- a/chatbot_poster_presentation.pptx
+++ b/chatbot_poster_presentation.pptx
@@ -213,7 +213,7 @@
           <a:p>
             <a:fld id="{33A8EAF1-A79B-46B8-BD2C-8FBB045AF4FC}" type="datetimeFigureOut">
               <a:rPr lang="de-DE" smtClean="0"/>
-              <a:t>28.07.2023</a:t>
+              <a:t>31.07.2023</a:t>
             </a:fld>
             <a:endParaRPr lang="de-DE"/>
           </a:p>
@@ -2849,38 +2849,20 @@
           <a:lstStyle/>
           <a:p>
             <a:r>
-              <a:rPr lang="de-DE" dirty="0" err="1"/>
-              <a:t>Lindey</a:t>
-            </a:r>
-            <a:r>
-              <a:rPr lang="de-DE" dirty="0"/>
-              <a:t> </a:t>
-            </a:r>
-            <a:r>
-              <a:rPr lang="de-DE" dirty="0" err="1"/>
-              <a:t>Vanderlyn</a:t>
-            </a:r>
-            <a:endParaRPr lang="de-DE" dirty="0"/>
-          </a:p>
-          <a:p>
-            <a:r>
-              <a:rPr lang="de-DE" dirty="0"/>
-              <a:t>Dirk Väth</a:t>
-            </a:r>
-          </a:p>
-          <a:p>
-            <a:r>
-              <a:rPr lang="de-DE" dirty="0"/>
-              <a:t>Prof. Dr. </a:t>
-            </a:r>
-            <a:r>
-              <a:rPr lang="de-DE" dirty="0" err="1"/>
-              <a:t>Than</a:t>
-            </a:r>
-            <a:r>
-              <a:rPr lang="de-DE" dirty="0"/>
-              <a:t> Vu</a:t>
-            </a:r>
+              <a:rPr lang="de-DE" sz="3600" dirty="0"/>
+              <a:t>Linnet Moxon</a:t>
+            </a:r>
+          </a:p>
+          <a:p>
+            <a:r>
+              <a:rPr lang="de-DE" sz="3600" dirty="0"/>
+              <a:t>Miriam </a:t>
+            </a:r>
+            <a:r>
+              <a:rPr lang="de-DE" sz="3600" dirty="0" err="1"/>
+              <a:t>Segiet</a:t>
+            </a:r>
+            <a:endParaRPr lang="de-DE" sz="3600" dirty="0"/>
           </a:p>
         </p:txBody>
       </p:sp>
@@ -2900,18 +2882,18 @@
           <a:lstStyle/>
           <a:p>
             <a:r>
-              <a:rPr lang="de-DE" dirty="0" err="1"/>
+              <a:rPr lang="de-DE" dirty="0"/>
+              <a:t>Spoken Dialog Systems:</a:t>
+            </a:r>
+          </a:p>
+          <a:p>
+            <a:r>
+              <a:rPr lang="de-DE" b="1" dirty="0" err="1"/>
               <a:t>Automated</a:t>
             </a:r>
             <a:r>
-              <a:rPr lang="de-DE" dirty="0"/>
+              <a:rPr lang="de-DE" b="1" dirty="0"/>
               <a:t> Smart Knowledge for Wilhelma</a:t>
-            </a:r>
-          </a:p>
-          <a:p>
-            <a:r>
-              <a:rPr lang="de-DE" dirty="0"/>
-              <a:t>Spoken Dialog Systems</a:t>
             </a:r>
           </a:p>
         </p:txBody>
@@ -2937,63 +2919,149 @@
           <a:lstStyle/>
           <a:p>
             <a:r>
-              <a:rPr lang="de-DE" sz="6600" b="1" dirty="0" err="1"/>
-              <a:t>Detailed</a:t>
-            </a:r>
-            <a:r>
-              <a:rPr lang="de-DE" sz="6600" b="1" dirty="0"/>
+              <a:rPr lang="de-DE" sz="5400" b="1" dirty="0"/>
+              <a:t>Domain</a:t>
+            </a:r>
+          </a:p>
+          <a:p>
+            <a:pPr algn="just"/>
+            <a:r>
+              <a:rPr lang="de-DE" sz="4400" dirty="0" err="1"/>
+              <a:t>information</a:t>
+            </a:r>
+            <a:r>
+              <a:rPr lang="de-DE" sz="4400" dirty="0"/>
               <a:t> </a:t>
             </a:r>
             <a:r>
-              <a:rPr lang="de-DE" sz="6600" b="1" dirty="0" err="1"/>
-              <a:t>information</a:t>
-            </a:r>
-            <a:r>
-              <a:rPr lang="de-DE" sz="6600" b="1" dirty="0"/>
+              <a:rPr lang="de-DE" sz="4400" dirty="0" err="1"/>
+              <a:t>about</a:t>
+            </a:r>
+            <a:r>
+              <a:rPr lang="de-DE" sz="4400" dirty="0"/>
               <a:t> </a:t>
             </a:r>
-          </a:p>
-          <a:p>
-            <a:r>
-              <a:rPr lang="de-DE" sz="6600" b="1" dirty="0" err="1"/>
-              <a:t>about</a:t>
-            </a:r>
-            <a:r>
-              <a:rPr lang="de-DE" sz="6600" b="1" dirty="0"/>
+            <a:r>
+              <a:rPr lang="de-DE" sz="4400" dirty="0" err="1"/>
+              <a:t>several</a:t>
+            </a:r>
+            <a:r>
+              <a:rPr lang="de-DE" sz="4400" dirty="0"/>
               <a:t> </a:t>
             </a:r>
             <a:r>
-              <a:rPr lang="de-DE" sz="6600" b="1" dirty="0" err="1"/>
+              <a:rPr lang="de-DE" sz="4400" dirty="0" err="1"/>
               <a:t>animals</a:t>
             </a:r>
             <a:r>
-              <a:rPr lang="de-DE" sz="6600" b="1" dirty="0"/>
+              <a:rPr lang="de-DE" sz="4400" dirty="0"/>
               <a:t> in </a:t>
             </a:r>
             <a:r>
-              <a:rPr lang="de-DE" sz="6600" b="1" dirty="0" err="1"/>
-              <a:t>Stuttgart‘s</a:t>
-            </a:r>
-            <a:r>
-              <a:rPr lang="de-DE" sz="6600" b="1" dirty="0"/>
+              <a:rPr lang="de-DE" sz="4400" dirty="0" err="1"/>
+              <a:t>the</a:t>
+            </a:r>
+            <a:r>
+              <a:rPr lang="de-DE" sz="4400" dirty="0"/>
+              <a:t> Wilhelma (</a:t>
+            </a:r>
+            <a:r>
+              <a:rPr lang="de-DE" sz="4400" dirty="0" err="1"/>
+              <a:t>zoo</a:t>
+            </a:r>
+            <a:r>
+              <a:rPr lang="de-DE" sz="4400" dirty="0"/>
+              <a:t> in Stuttgart);</a:t>
+            </a:r>
+          </a:p>
+          <a:p>
+            <a:pPr algn="just"/>
+            <a:r>
+              <a:rPr lang="de-DE" sz="4400" dirty="0" err="1"/>
+              <a:t>suggestion</a:t>
+            </a:r>
+            <a:r>
+              <a:rPr lang="de-DE" sz="4400" dirty="0"/>
+              <a:t> on how to </a:t>
+            </a:r>
+            <a:r>
+              <a:rPr lang="de-DE" sz="4400" dirty="0" err="1"/>
+              <a:t>visit</a:t>
+            </a:r>
+            <a:r>
+              <a:rPr lang="de-DE" sz="4400" dirty="0"/>
               <a:t> </a:t>
             </a:r>
             <a:r>
-              <a:rPr lang="de-DE" sz="6600" b="1" dirty="0" err="1"/>
-              <a:t>zoo</a:t>
-            </a:r>
-            <a:endParaRPr lang="de-DE" sz="6600" b="1" dirty="0"/>
-          </a:p>
-          <a:p>
-            <a:endParaRPr lang="de-DE" sz="6000" dirty="0">
-              <a:solidFill>
-                <a:srgbClr val="002060"/>
-              </a:solidFill>
-            </a:endParaRPr>
-          </a:p>
-          <a:p>
-            <a:r>
-              <a:rPr lang="de-DE" sz="6000" dirty="0">
+              <a:rPr lang="de-DE" sz="4400" dirty="0" err="1"/>
+              <a:t>them</a:t>
+            </a:r>
+            <a:r>
+              <a:rPr lang="de-DE" sz="4400" dirty="0"/>
+              <a:t> in </a:t>
+            </a:r>
+            <a:r>
+              <a:rPr lang="de-DE" sz="4400" dirty="0" err="1"/>
+              <a:t>the</a:t>
+            </a:r>
+            <a:r>
+              <a:rPr lang="de-DE" sz="4400" dirty="0"/>
+              <a:t> </a:t>
+            </a:r>
+            <a:r>
+              <a:rPr lang="de-DE" sz="4400" dirty="0" err="1"/>
+              <a:t>best</a:t>
+            </a:r>
+            <a:r>
+              <a:rPr lang="de-DE" sz="4400" dirty="0"/>
+              <a:t> </a:t>
+            </a:r>
+            <a:r>
+              <a:rPr lang="de-DE" sz="4400" dirty="0" err="1"/>
+              <a:t>order</a:t>
+            </a:r>
+            <a:r>
+              <a:rPr lang="de-DE" sz="4400" dirty="0"/>
+              <a:t>, </a:t>
+            </a:r>
+            <a:r>
+              <a:rPr lang="de-DE" sz="4400" dirty="0" err="1"/>
+              <a:t>according</a:t>
+            </a:r>
+            <a:r>
+              <a:rPr lang="de-DE" sz="4400" dirty="0"/>
+              <a:t> to </a:t>
+            </a:r>
+            <a:r>
+              <a:rPr lang="de-DE" sz="4400" dirty="0" err="1"/>
+              <a:t>their</a:t>
+            </a:r>
+            <a:r>
+              <a:rPr lang="de-DE" sz="4400" dirty="0"/>
+              <a:t> </a:t>
+            </a:r>
+            <a:r>
+              <a:rPr lang="de-DE" sz="4400" dirty="0" err="1"/>
+              <a:t>feeding</a:t>
+            </a:r>
+            <a:r>
+              <a:rPr lang="de-DE" sz="4400" dirty="0"/>
+              <a:t> time </a:t>
+            </a:r>
+          </a:p>
+          <a:p>
+            <a:endParaRPr lang="de-DE" sz="5400" dirty="0"/>
+          </a:p>
+          <a:p>
+            <a:r>
+              <a:rPr lang="de-DE" sz="5400" b="1" dirty="0" err="1"/>
+              <a:t>Example</a:t>
+            </a:r>
+            <a:endParaRPr lang="de-DE" sz="4400" b="1" dirty="0"/>
+          </a:p>
+          <a:p>
+            <a:r>
+              <a:rPr lang="de-DE" sz="4400" dirty="0">
                 <a:solidFill>
                   <a:srgbClr val="002060"/>
                 </a:solidFill>
@@ -3001,7 +3069,7 @@
               <a:t>Welcome! How </a:t>
             </a:r>
             <a:r>
-              <a:rPr lang="de-DE" sz="6000" dirty="0" err="1">
+              <a:rPr lang="de-DE" sz="4400" dirty="0" err="1">
                 <a:solidFill>
                   <a:srgbClr val="002060"/>
                 </a:solidFill>
@@ -3009,7 +3077,7 @@
               <a:t>may</a:t>
             </a:r>
             <a:r>
-              <a:rPr lang="de-DE" sz="6000" dirty="0">
+              <a:rPr lang="de-DE" sz="4400" dirty="0">
                 <a:solidFill>
                   <a:srgbClr val="002060"/>
                 </a:solidFill>
@@ -3017,7 +3085,7 @@
               <a:t> I </a:t>
             </a:r>
             <a:r>
-              <a:rPr lang="de-DE" sz="6000" dirty="0" err="1">
+              <a:rPr lang="de-DE" sz="4400" dirty="0" err="1">
                 <a:solidFill>
                   <a:srgbClr val="002060"/>
                 </a:solidFill>
@@ -3025,7 +3093,7 @@
               <a:t>help</a:t>
             </a:r>
             <a:r>
-              <a:rPr lang="de-DE" sz="6000" dirty="0">
+              <a:rPr lang="de-DE" sz="4400" dirty="0">
                 <a:solidFill>
                   <a:srgbClr val="002060"/>
                 </a:solidFill>
@@ -3036,21 +3104,21 @@
           <a:p>
             <a:pPr algn="r"/>
             <a:r>
-              <a:rPr lang="de-DE" sz="6000" dirty="0"/>
+              <a:rPr lang="de-DE" sz="4400" dirty="0"/>
               <a:t>	</a:t>
             </a:r>
             <a:r>
-              <a:rPr lang="de-DE" sz="6000" dirty="0">
+              <a:rPr lang="de-DE" sz="4400" dirty="0">
                 <a:solidFill>
                   <a:schemeClr val="accent5">
                     <a:lumMod val="75000"/>
                   </a:schemeClr>
                 </a:solidFill>
               </a:rPr>
-              <a:t>… I am </a:t>
-            </a:r>
-            <a:r>
-              <a:rPr lang="de-DE" sz="6000" dirty="0" err="1">
+              <a:t>I am </a:t>
+            </a:r>
+            <a:r>
+              <a:rPr lang="de-DE" sz="4400" dirty="0" err="1">
                 <a:solidFill>
                   <a:schemeClr val="accent5">
                     <a:lumMod val="75000"/>
@@ -3060,7 +3128,7 @@
               <a:t>looking</a:t>
             </a:r>
             <a:r>
-              <a:rPr lang="de-DE" sz="6000" dirty="0">
+              <a:rPr lang="de-DE" sz="4400" dirty="0">
                 <a:solidFill>
                   <a:schemeClr val="accent5">
                     <a:lumMod val="75000"/>
@@ -3070,7 +3138,7 @@
               <a:t> for a </a:t>
             </a:r>
             <a:r>
-              <a:rPr lang="de-DE" sz="6000" dirty="0" err="1">
+              <a:rPr lang="de-DE" sz="4400" dirty="0" err="1">
                 <a:solidFill>
                   <a:schemeClr val="accent5">
                     <a:lumMod val="75000"/>
@@ -3080,7 +3148,7 @@
               <a:t>brown</a:t>
             </a:r>
             <a:r>
-              <a:rPr lang="de-DE" sz="6000" dirty="0">
+              <a:rPr lang="de-DE" sz="4400" dirty="0">
                 <a:solidFill>
                   <a:schemeClr val="accent5">
                     <a:lumMod val="75000"/>
@@ -3090,7 +3158,7 @@
               <a:t> </a:t>
             </a:r>
             <a:r>
-              <a:rPr lang="de-DE" sz="6000" dirty="0" err="1">
+              <a:rPr lang="de-DE" sz="4400" dirty="0" err="1">
                 <a:solidFill>
                   <a:schemeClr val="accent5">
                     <a:lumMod val="75000"/>
@@ -3099,7 +3167,7 @@
               </a:rPr>
               <a:t>animal</a:t>
             </a:r>
-            <a:endParaRPr lang="de-DE" sz="6000" dirty="0">
+            <a:endParaRPr lang="de-DE" sz="4400" dirty="0">
               <a:solidFill>
                 <a:schemeClr val="accent5">
                   <a:lumMod val="75000"/>
@@ -3109,7 +3177,7 @@
           </a:p>
           <a:p>
             <a:r>
-              <a:rPr lang="de-DE" sz="6000" dirty="0">
+              <a:rPr lang="de-DE" sz="4400" dirty="0">
                 <a:solidFill>
                   <a:srgbClr val="002060"/>
                 </a:solidFill>
@@ -3117,7 +3185,7 @@
               <a:t>What </a:t>
             </a:r>
             <a:r>
-              <a:rPr lang="de-DE" sz="6000" dirty="0" err="1">
+              <a:rPr lang="de-DE" sz="4400" dirty="0" err="1">
                 <a:solidFill>
                   <a:srgbClr val="002060"/>
                 </a:solidFill>
@@ -3125,7 +3193,7 @@
               <a:t>should</a:t>
             </a:r>
             <a:r>
-              <a:rPr lang="de-DE" sz="6000" dirty="0">
+              <a:rPr lang="de-DE" sz="4400" dirty="0">
                 <a:solidFill>
                   <a:srgbClr val="002060"/>
                 </a:solidFill>
@@ -3133,7 +3201,7 @@
               <a:t> </a:t>
             </a:r>
             <a:r>
-              <a:rPr lang="de-DE" sz="6000" dirty="0" err="1">
+              <a:rPr lang="de-DE" sz="4400" dirty="0" err="1">
                 <a:solidFill>
                   <a:srgbClr val="002060"/>
                 </a:solidFill>
@@ -3141,7 +3209,7 @@
               <a:t>the</a:t>
             </a:r>
             <a:r>
-              <a:rPr lang="de-DE" sz="6000" dirty="0">
+              <a:rPr lang="de-DE" sz="4400" dirty="0">
                 <a:solidFill>
                   <a:srgbClr val="002060"/>
                 </a:solidFill>
@@ -3149,7 +3217,7 @@
               <a:t> </a:t>
             </a:r>
             <a:r>
-              <a:rPr lang="de-DE" sz="6000" dirty="0" err="1">
+              <a:rPr lang="de-DE" sz="4400" dirty="0" err="1">
                 <a:solidFill>
                   <a:srgbClr val="002060"/>
                 </a:solidFill>
@@ -3157,15 +3225,17 @@
               <a:t>animal‘s</a:t>
             </a:r>
             <a:r>
-              <a:rPr lang="de-DE" sz="6000" dirty="0">
+              <a:rPr lang="de-DE" sz="4400" dirty="0">
                 <a:solidFill>
                   <a:srgbClr val="002060"/>
                 </a:solidFill>
               </a:rPr>
               <a:t> </a:t>
             </a:r>
-            <a:r>
-              <a:rPr lang="de-DE" sz="6000" dirty="0" err="1">
+          </a:p>
+          <a:p>
+            <a:r>
+              <a:rPr lang="de-DE" sz="4400" dirty="0" err="1">
                 <a:solidFill>
                   <a:srgbClr val="002060"/>
                 </a:solidFill>
@@ -3173,7 +3243,7 @@
               <a:t>continent</a:t>
             </a:r>
             <a:r>
-              <a:rPr lang="de-DE" sz="6000" dirty="0">
+              <a:rPr lang="de-DE" sz="4400" dirty="0">
                 <a:solidFill>
                   <a:srgbClr val="002060"/>
                 </a:solidFill>
@@ -3181,7 +3251,7 @@
               <a:t> </a:t>
             </a:r>
             <a:r>
-              <a:rPr lang="de-DE" sz="6000" dirty="0" err="1">
+              <a:rPr lang="de-DE" sz="4400" dirty="0" err="1">
                 <a:solidFill>
                   <a:srgbClr val="002060"/>
                 </a:solidFill>
@@ -3189,7 +3259,7 @@
               <a:t>of</a:t>
             </a:r>
             <a:r>
-              <a:rPr lang="de-DE" sz="6000" dirty="0">
+              <a:rPr lang="de-DE" sz="4400" dirty="0">
                 <a:solidFill>
                   <a:srgbClr val="002060"/>
                 </a:solidFill>
@@ -3197,7 +3267,7 @@
               <a:t> </a:t>
             </a:r>
             <a:r>
-              <a:rPr lang="de-DE" sz="6000" dirty="0" err="1">
+              <a:rPr lang="de-DE" sz="4400" dirty="0" err="1">
                 <a:solidFill>
                   <a:srgbClr val="002060"/>
                 </a:solidFill>
@@ -3205,7 +3275,7 @@
               <a:t>origin</a:t>
             </a:r>
             <a:r>
-              <a:rPr lang="de-DE" sz="6000" dirty="0">
+              <a:rPr lang="de-DE" sz="4400" dirty="0">
                 <a:solidFill>
                   <a:srgbClr val="002060"/>
                 </a:solidFill>
@@ -3213,7 +3283,7 @@
               <a:t> </a:t>
             </a:r>
             <a:r>
-              <a:rPr lang="de-DE" sz="6000" dirty="0" err="1">
+              <a:rPr lang="de-DE" sz="4400" dirty="0" err="1">
                 <a:solidFill>
                   <a:srgbClr val="002060"/>
                 </a:solidFill>
@@ -3221,7 +3291,7 @@
               <a:t>be</a:t>
             </a:r>
             <a:r>
-              <a:rPr lang="de-DE" sz="6000" dirty="0">
+              <a:rPr lang="de-DE" sz="4400" dirty="0">
                 <a:solidFill>
                   <a:srgbClr val="002060"/>
                 </a:solidFill>
@@ -3232,110 +3302,100 @@
           <a:p>
             <a:pPr algn="r"/>
             <a:r>
-              <a:rPr lang="de-DE" sz="6000" dirty="0"/>
-              <a:t>		</a:t>
-            </a:r>
-            <a:r>
-              <a:rPr lang="de-DE" sz="6000" dirty="0">
+              <a:rPr lang="de-DE" sz="4400" dirty="0"/>
+              <a:t>	</a:t>
+            </a:r>
+            <a:r>
+              <a:rPr lang="de-DE" sz="4400" dirty="0" err="1">
                 <a:solidFill>
                   <a:schemeClr val="accent5">
                     <a:lumMod val="75000"/>
                   </a:schemeClr>
                 </a:solidFill>
               </a:rPr>
-              <a:t>… </a:t>
-            </a:r>
-            <a:r>
-              <a:rPr lang="de-DE" sz="6000" dirty="0" err="1">
+              <a:t>It</a:t>
+            </a:r>
+            <a:r>
+              <a:rPr lang="de-DE" sz="4400" dirty="0">
                 <a:solidFill>
                   <a:schemeClr val="accent5">
                     <a:lumMod val="75000"/>
                   </a:schemeClr>
                 </a:solidFill>
               </a:rPr>
-              <a:t>it</a:t>
-            </a:r>
-            <a:r>
-              <a:rPr lang="de-DE" sz="6000" dirty="0">
+              <a:t> </a:t>
+            </a:r>
+            <a:r>
+              <a:rPr lang="de-DE" sz="4400" dirty="0" err="1">
                 <a:solidFill>
                   <a:schemeClr val="accent5">
                     <a:lumMod val="75000"/>
                   </a:schemeClr>
                 </a:solidFill>
               </a:rPr>
-              <a:t> </a:t>
-            </a:r>
-            <a:r>
-              <a:rPr lang="de-DE" sz="6000" dirty="0" err="1">
+              <a:t>should</a:t>
+            </a:r>
+            <a:r>
+              <a:rPr lang="de-DE" sz="4400" dirty="0">
                 <a:solidFill>
                   <a:schemeClr val="accent5">
                     <a:lumMod val="75000"/>
                   </a:schemeClr>
                 </a:solidFill>
               </a:rPr>
-              <a:t>should</a:t>
-            </a:r>
-            <a:r>
-              <a:rPr lang="de-DE" sz="6000" dirty="0">
+              <a:t> </a:t>
+            </a:r>
+            <a:r>
+              <a:rPr lang="de-DE" sz="4400" dirty="0" err="1">
                 <a:solidFill>
                   <a:schemeClr val="accent5">
                     <a:lumMod val="75000"/>
                   </a:schemeClr>
                 </a:solidFill>
               </a:rPr>
-              <a:t> </a:t>
-            </a:r>
-            <a:r>
-              <a:rPr lang="de-DE" sz="6000" dirty="0" err="1">
+              <a:t>be</a:t>
+            </a:r>
+            <a:r>
+              <a:rPr lang="de-DE" sz="4400" dirty="0">
                 <a:solidFill>
                   <a:schemeClr val="accent5">
                     <a:lumMod val="75000"/>
                   </a:schemeClr>
                 </a:solidFill>
               </a:rPr>
-              <a:t>be</a:t>
-            </a:r>
-            <a:r>
-              <a:rPr lang="de-DE" sz="6000" dirty="0">
+              <a:t> </a:t>
+            </a:r>
+            <a:r>
+              <a:rPr lang="de-DE" sz="4400" dirty="0" err="1">
                 <a:solidFill>
                   <a:schemeClr val="accent5">
                     <a:lumMod val="75000"/>
                   </a:schemeClr>
                 </a:solidFill>
               </a:rPr>
-              <a:t> </a:t>
-            </a:r>
-            <a:r>
-              <a:rPr lang="de-DE" sz="6000" dirty="0" err="1">
+              <a:t>south</a:t>
+            </a:r>
+            <a:r>
+              <a:rPr lang="de-DE" sz="4400" dirty="0">
                 <a:solidFill>
                   <a:schemeClr val="accent5">
                     <a:lumMod val="75000"/>
                   </a:schemeClr>
                 </a:solidFill>
               </a:rPr>
-              <a:t>south</a:t>
-            </a:r>
-            <a:r>
-              <a:rPr lang="de-DE" sz="6000" dirty="0">
+              <a:t> </a:t>
+            </a:r>
+            <a:r>
+              <a:rPr lang="de-DE" sz="4400" dirty="0" err="1">
                 <a:solidFill>
                   <a:schemeClr val="accent5">
                     <a:lumMod val="75000"/>
                   </a:schemeClr>
                 </a:solidFill>
               </a:rPr>
-              <a:t> </a:t>
-            </a:r>
-            <a:r>
-              <a:rPr lang="de-DE" sz="6000" dirty="0" err="1">
-                <a:solidFill>
-                  <a:schemeClr val="accent5">
-                    <a:lumMod val="75000"/>
-                  </a:schemeClr>
-                </a:solidFill>
-              </a:rPr>
               <a:t>america</a:t>
             </a:r>
-            <a:endParaRPr lang="de-DE" sz="6000" dirty="0">
+            <a:endParaRPr lang="de-DE" sz="4400" dirty="0">
               <a:solidFill>
                 <a:schemeClr val="accent5">
                   <a:lumMod val="75000"/>
@@ -3345,23 +3405,33 @@
           </a:p>
           <a:p>
             <a:r>
-              <a:rPr lang="en-US" sz="6000" dirty="0">
+              <a:rPr lang="en-US" sz="4400" dirty="0">
                 <a:solidFill>
                   <a:srgbClr val="002060"/>
                 </a:solidFill>
               </a:rPr>
-              <a:t>The animal called two toed sloth is mainly brown and it comes from south </a:t>
-            </a:r>
-            <a:r>
-              <a:rPr lang="en-US" sz="6000" dirty="0" err="1">
+              <a:t>The animal called two toed sloth </a:t>
+            </a:r>
+          </a:p>
+          <a:p>
+            <a:r>
+              <a:rPr lang="en-US" sz="4400" dirty="0">
                 <a:solidFill>
                   <a:srgbClr val="002060"/>
                 </a:solidFill>
               </a:rPr>
+              <a:t>is mainly brown and it comes from south </a:t>
+            </a:r>
+            <a:r>
+              <a:rPr lang="en-US" sz="4400" dirty="0" err="1">
+                <a:solidFill>
+                  <a:srgbClr val="002060"/>
+                </a:solidFill>
+              </a:rPr>
               <a:t>america</a:t>
             </a:r>
             <a:r>
-              <a:rPr lang="en-US" sz="6000" dirty="0">
+              <a:rPr lang="en-US" sz="4400" dirty="0">
                 <a:solidFill>
                   <a:srgbClr val="002060"/>
                 </a:solidFill>
@@ -3372,23 +3442,23 @@
           <a:p>
             <a:pPr algn="r"/>
             <a:r>
-              <a:rPr lang="en-US" sz="6000" dirty="0"/>
+              <a:rPr lang="en-US" sz="4400" dirty="0"/>
               <a:t>	</a:t>
             </a:r>
             <a:r>
-              <a:rPr lang="en-US" sz="6000" dirty="0">
+              <a:rPr lang="en-US" sz="4400" dirty="0">
                 <a:solidFill>
                   <a:schemeClr val="accent5">
                     <a:lumMod val="75000"/>
                   </a:schemeClr>
                 </a:solidFill>
               </a:rPr>
-              <a:t>… what is its main food?</a:t>
-            </a:r>
-          </a:p>
-          <a:p>
-            <a:r>
-              <a:rPr lang="en-US" sz="6000" dirty="0">
+              <a:t>What is its main food?</a:t>
+            </a:r>
+          </a:p>
+          <a:p>
+            <a:r>
+              <a:rPr lang="en-US" sz="4400" dirty="0">
                 <a:solidFill>
                   <a:srgbClr val="002060"/>
                 </a:solidFill>
@@ -3399,29 +3469,242 @@
           <a:p>
             <a:pPr algn="r"/>
             <a:r>
-              <a:rPr lang="en-US" sz="6000" dirty="0"/>
-              <a:t>		</a:t>
-            </a:r>
-            <a:r>
-              <a:rPr lang="en-US" sz="6000" dirty="0">
+              <a:rPr lang="en-US" sz="4400" dirty="0"/>
+              <a:t>	</a:t>
+            </a:r>
+            <a:r>
+              <a:rPr lang="en-US" sz="4400" dirty="0">
                 <a:solidFill>
                   <a:schemeClr val="accent5">
                     <a:lumMod val="75000"/>
                   </a:schemeClr>
                 </a:solidFill>
               </a:rPr>
-              <a:t>… tell me about its specialties</a:t>
-            </a:r>
-          </a:p>
-          <a:p>
-            <a:r>
-              <a:rPr lang="en-US" sz="6000" dirty="0">
+              <a:t>Tell me about its specialties</a:t>
+            </a:r>
+          </a:p>
+          <a:p>
+            <a:r>
+              <a:rPr lang="en-US" sz="4400" dirty="0">
                 <a:solidFill>
                   <a:srgbClr val="002060"/>
                 </a:solidFill>
               </a:rPr>
               <a:t>The animal called two toed sloth it is the slowest mammal.</a:t>
             </a:r>
+          </a:p>
+          <a:p>
+            <a:endParaRPr lang="en-US" sz="4400" dirty="0">
+              <a:solidFill>
+                <a:srgbClr val="002060"/>
+              </a:solidFill>
+            </a:endParaRPr>
+          </a:p>
+          <a:p>
+            <a:r>
+              <a:rPr lang="de-DE" sz="5400" b="1" dirty="0"/>
+              <a:t>Opening Hours</a:t>
+            </a:r>
+          </a:p>
+          <a:p>
+            <a:r>
+              <a:rPr lang="de-DE" sz="4400" dirty="0" err="1">
+                <a:solidFill>
+                  <a:schemeClr val="tx1">
+                    <a:lumMod val="50000"/>
+                  </a:schemeClr>
+                </a:solidFill>
+                <a:latin typeface="Univers for UniS 65 Bold Rg" panose="020B0703030502020204"/>
+              </a:rPr>
+              <a:t>encoded</a:t>
+            </a:r>
+            <a:r>
+              <a:rPr lang="de-DE" sz="4400" dirty="0">
+                <a:solidFill>
+                  <a:schemeClr val="tx1">
+                    <a:lumMod val="50000"/>
+                  </a:schemeClr>
+                </a:solidFill>
+                <a:latin typeface="Univers for UniS 65 Bold Rg" panose="020B0703030502020204"/>
+              </a:rPr>
+              <a:t> </a:t>
+            </a:r>
+            <a:r>
+              <a:rPr lang="de-DE" sz="4400" dirty="0" err="1">
+                <a:solidFill>
+                  <a:schemeClr val="tx1">
+                    <a:lumMod val="50000"/>
+                  </a:schemeClr>
+                </a:solidFill>
+                <a:latin typeface="Univers for UniS 65 Bold Rg" panose="020B0703030502020204"/>
+              </a:rPr>
+              <a:t>as</a:t>
+            </a:r>
+            <a:r>
+              <a:rPr lang="de-DE" sz="4400" dirty="0">
+                <a:solidFill>
+                  <a:schemeClr val="tx1">
+                    <a:lumMod val="50000"/>
+                  </a:schemeClr>
+                </a:solidFill>
+                <a:latin typeface="Univers for UniS 65 Bold Rg" panose="020B0703030502020204"/>
+              </a:rPr>
+              <a:t>  a </a:t>
+            </a:r>
+            <a:r>
+              <a:rPr lang="de-DE" sz="4400" dirty="0" err="1">
+                <a:solidFill>
+                  <a:schemeClr val="tx1">
+                    <a:lumMod val="50000"/>
+                  </a:schemeClr>
+                </a:solidFill>
+                <a:latin typeface="Univers for UniS 65 Bold Rg" panose="020B0703030502020204"/>
+              </a:rPr>
+              <a:t>SysActionType</a:t>
+            </a:r>
+            <a:r>
+              <a:rPr lang="de-DE" sz="4400" dirty="0">
+                <a:solidFill>
+                  <a:schemeClr val="tx1">
+                    <a:lumMod val="50000"/>
+                  </a:schemeClr>
+                </a:solidFill>
+                <a:latin typeface="Univers for UniS 65 Bold Rg" panose="020B0703030502020204"/>
+              </a:rPr>
+              <a:t>;</a:t>
+            </a:r>
+          </a:p>
+          <a:p>
+            <a:r>
+              <a:rPr lang="de-DE" sz="4400" dirty="0" err="1">
+                <a:solidFill>
+                  <a:schemeClr val="tx1">
+                    <a:lumMod val="50000"/>
+                  </a:schemeClr>
+                </a:solidFill>
+                <a:latin typeface="Univers for UniS 65 Bold Rg" panose="020B0703030502020204"/>
+              </a:rPr>
+              <a:t>hard</a:t>
+            </a:r>
+            <a:r>
+              <a:rPr lang="de-DE" sz="4400" dirty="0">
+                <a:solidFill>
+                  <a:schemeClr val="tx1">
+                    <a:lumMod val="50000"/>
+                  </a:schemeClr>
+                </a:solidFill>
+                <a:latin typeface="Univers for UniS 65 Bold Rg" panose="020B0703030502020204"/>
+              </a:rPr>
+              <a:t> </a:t>
+            </a:r>
+            <a:r>
+              <a:rPr lang="de-DE" sz="4400" dirty="0" err="1">
+                <a:solidFill>
+                  <a:schemeClr val="tx1">
+                    <a:lumMod val="50000"/>
+                  </a:schemeClr>
+                </a:solidFill>
+                <a:latin typeface="Univers for UniS 65 Bold Rg" panose="020B0703030502020204"/>
+              </a:rPr>
+              <a:t>coded</a:t>
+            </a:r>
+            <a:r>
+              <a:rPr lang="de-DE" sz="4400" dirty="0">
+                <a:solidFill>
+                  <a:schemeClr val="tx1">
+                    <a:lumMod val="50000"/>
+                  </a:schemeClr>
+                </a:solidFill>
+                <a:latin typeface="Univers for UniS 65 Bold Rg" panose="020B0703030502020204"/>
+              </a:rPr>
+              <a:t> </a:t>
+            </a:r>
+            <a:r>
+              <a:rPr lang="de-DE" sz="4400" dirty="0" err="1">
+                <a:solidFill>
+                  <a:schemeClr val="tx1">
+                    <a:lumMod val="50000"/>
+                  </a:schemeClr>
+                </a:solidFill>
+                <a:latin typeface="Univers for UniS 65 Bold Rg" panose="020B0703030502020204"/>
+              </a:rPr>
+              <a:t>template</a:t>
+            </a:r>
+            <a:r>
+              <a:rPr lang="de-DE" sz="4400" dirty="0">
+                <a:solidFill>
+                  <a:schemeClr val="tx1">
+                    <a:lumMod val="50000"/>
+                  </a:schemeClr>
+                </a:solidFill>
+                <a:latin typeface="Univers for UniS 65 Bold Rg" panose="020B0703030502020204"/>
+              </a:rPr>
+              <a:t> </a:t>
+            </a:r>
+            <a:r>
+              <a:rPr lang="de-DE" sz="4400" dirty="0" err="1">
+                <a:solidFill>
+                  <a:schemeClr val="tx1">
+                    <a:lumMod val="50000"/>
+                  </a:schemeClr>
+                </a:solidFill>
+                <a:latin typeface="Univers for UniS 65 Bold Rg" panose="020B0703030502020204"/>
+              </a:rPr>
+              <a:t>opening</a:t>
+            </a:r>
+            <a:r>
+              <a:rPr lang="de-DE" sz="4400" dirty="0">
+                <a:solidFill>
+                  <a:schemeClr val="tx1">
+                    <a:lumMod val="50000"/>
+                  </a:schemeClr>
+                </a:solidFill>
+                <a:latin typeface="Univers for UniS 65 Bold Rg" panose="020B0703030502020204"/>
+              </a:rPr>
+              <a:t>(), </a:t>
+            </a:r>
+            <a:r>
+              <a:rPr lang="de-DE" sz="4400" dirty="0" err="1">
+                <a:solidFill>
+                  <a:schemeClr val="tx1">
+                    <a:lumMod val="50000"/>
+                  </a:schemeClr>
+                </a:solidFill>
+                <a:latin typeface="Univers for UniS 65 Bold Rg" panose="020B0703030502020204"/>
+              </a:rPr>
+              <a:t>containing</a:t>
+            </a:r>
+            <a:r>
+              <a:rPr lang="de-DE" sz="4400" dirty="0">
+                <a:solidFill>
+                  <a:schemeClr val="tx1">
+                    <a:lumMod val="50000"/>
+                  </a:schemeClr>
+                </a:solidFill>
+                <a:latin typeface="Univers for UniS 65 Bold Rg" panose="020B0703030502020204"/>
+              </a:rPr>
+              <a:t> </a:t>
+            </a:r>
+            <a:r>
+              <a:rPr lang="de-DE" sz="4400" dirty="0" err="1">
+                <a:solidFill>
+                  <a:schemeClr val="tx1">
+                    <a:lumMod val="50000"/>
+                  </a:schemeClr>
+                </a:solidFill>
+                <a:latin typeface="Univers for UniS 65 Bold Rg" panose="020B0703030502020204"/>
+              </a:rPr>
+              <a:t>information</a:t>
+            </a:r>
+            <a:endParaRPr lang="de-DE" sz="4400" dirty="0">
+              <a:solidFill>
+                <a:schemeClr val="tx1">
+                  <a:lumMod val="50000"/>
+                </a:schemeClr>
+              </a:solidFill>
+              <a:effectLst/>
+              <a:latin typeface="Univers for UniS 65 Bold Rg" panose="020B0703030502020204"/>
+            </a:endParaRPr>
           </a:p>
           <a:p>
             <a:pPr algn="r"/>
@@ -3441,8 +3724,8 @@
         </p:nvSpPr>
         <p:spPr>
           <a:xfrm>
-            <a:off x="17515830" y="7384579"/>
-            <a:ext cx="23130193" cy="19861971"/>
+            <a:off x="17515830" y="7384581"/>
+            <a:ext cx="23130193" cy="15485262"/>
           </a:xfrm>
         </p:spPr>
         <p:txBody>
@@ -3450,416 +3733,495 @@
           <a:lstStyle/>
           <a:p>
             <a:r>
-              <a:rPr lang="de-DE" sz="6600" b="1" dirty="0" err="1"/>
+              <a:rPr lang="de-DE" sz="5400" b="1" dirty="0" err="1"/>
               <a:t>Visiting</a:t>
             </a:r>
             <a:r>
-              <a:rPr lang="de-DE" sz="6600" b="1" dirty="0"/>
+              <a:rPr lang="de-DE" sz="5400" b="1" dirty="0"/>
               <a:t> Path </a:t>
             </a:r>
           </a:p>
           <a:p>
-            <a:endParaRPr lang="de-DE" sz="6000" b="1" dirty="0"/>
-          </a:p>
-          <a:p>
-            <a:r>
-              <a:rPr lang="de-DE" sz="6000" dirty="0" err="1">
-                <a:latin typeface="Univers for UniS 65 Bold Rg" panose="020B0703030502020204"/>
-              </a:rPr>
-              <a:t>implementation</a:t>
-            </a:r>
-            <a:endParaRPr lang="de-DE" sz="6000" dirty="0">
-              <a:latin typeface="Univers for UniS 65 Bold Rg" panose="020B0703030502020204"/>
-            </a:endParaRPr>
-          </a:p>
-          <a:p>
-            <a:r>
-              <a:rPr lang="de-DE" sz="6000" dirty="0" err="1">
-                <a:latin typeface="Univers for UniS 65 Bold Rg" panose="020B0703030502020204"/>
-              </a:rPr>
-              <a:t>example</a:t>
-            </a:r>
-            <a:endParaRPr lang="de-DE" sz="6000" dirty="0">
-              <a:latin typeface="Univers for UniS 65 Bold Rg" panose="020B0703030502020204"/>
-            </a:endParaRPr>
-          </a:p>
-          <a:p>
-            <a:endParaRPr lang="de-DE" sz="6000" b="1" dirty="0"/>
-          </a:p>
-          <a:p>
-            <a:endParaRPr lang="de-DE" sz="6000" b="1" dirty="0"/>
-          </a:p>
-          <a:p>
-            <a:r>
-              <a:rPr lang="de-DE" sz="6600" b="1" dirty="0"/>
-              <a:t>Opening Hours</a:t>
-            </a:r>
-          </a:p>
-          <a:p>
-            <a:r>
-              <a:rPr lang="de-DE" sz="6000" dirty="0" err="1">
-                <a:solidFill>
-                  <a:schemeClr val="tx1">
-                    <a:lumMod val="50000"/>
+            <a:r>
+              <a:rPr lang="de-DE" sz="4400" dirty="0"/>
+              <a:t>	</a:t>
+            </a:r>
+            <a:r>
+              <a:rPr lang="de-DE" sz="4400" dirty="0">
+                <a:solidFill>
+                  <a:schemeClr val="accent5">
+                    <a:lumMod val="75000"/>
                   </a:schemeClr>
                 </a:solidFill>
-                <a:latin typeface="Univers for UniS 65 Bold Rg" panose="020B0703030502020204"/>
-              </a:rPr>
-              <a:t>encoded</a:t>
-            </a:r>
-            <a:r>
-              <a:rPr lang="de-DE" sz="6000" dirty="0">
-                <a:solidFill>
-                  <a:schemeClr val="tx1">
-                    <a:lumMod val="50000"/>
+              </a:rPr>
+              <a:t>I </a:t>
+            </a:r>
+            <a:r>
+              <a:rPr lang="de-DE" sz="4400" dirty="0" err="1">
+                <a:solidFill>
+                  <a:schemeClr val="accent5">
+                    <a:lumMod val="75000"/>
                   </a:schemeClr>
                 </a:solidFill>
-                <a:latin typeface="Univers for UniS 65 Bold Rg" panose="020B0703030502020204"/>
+              </a:rPr>
+              <a:t>want</a:t>
+            </a:r>
+            <a:r>
+              <a:rPr lang="de-DE" sz="4400" dirty="0">
+                <a:solidFill>
+                  <a:schemeClr val="accent5">
+                    <a:lumMod val="75000"/>
+                  </a:schemeClr>
+                </a:solidFill>
+              </a:rPr>
+              <a:t> to </a:t>
+            </a:r>
+            <a:r>
+              <a:rPr lang="de-DE" sz="4400" dirty="0" err="1">
+                <a:solidFill>
+                  <a:schemeClr val="accent5">
+                    <a:lumMod val="75000"/>
+                  </a:schemeClr>
+                </a:solidFill>
+              </a:rPr>
+              <a:t>visit</a:t>
+            </a:r>
+            <a:r>
+              <a:rPr lang="de-DE" sz="4400" dirty="0">
+                <a:solidFill>
+                  <a:schemeClr val="accent5">
+                    <a:lumMod val="75000"/>
+                  </a:schemeClr>
+                </a:solidFill>
               </a:rPr>
               <a:t> </a:t>
             </a:r>
             <a:r>
-              <a:rPr lang="de-DE" sz="6000" dirty="0" err="1">
-                <a:solidFill>
-                  <a:schemeClr val="tx1">
-                    <a:lumMod val="50000"/>
+              <a:rPr lang="de-DE" sz="4400" dirty="0" err="1">
+                <a:solidFill>
+                  <a:schemeClr val="accent5">
+                    <a:lumMod val="75000"/>
                   </a:schemeClr>
                 </a:solidFill>
-                <a:latin typeface="Univers for UniS 65 Bold Rg" panose="020B0703030502020204"/>
-              </a:rPr>
-              <a:t>as</a:t>
-            </a:r>
-            <a:r>
-              <a:rPr lang="de-DE" sz="6000" dirty="0">
-                <a:solidFill>
-                  <a:schemeClr val="tx1">
-                    <a:lumMod val="50000"/>
+              </a:rPr>
+              <a:t>the</a:t>
+            </a:r>
+            <a:r>
+              <a:rPr lang="de-DE" sz="4400" dirty="0">
+                <a:solidFill>
+                  <a:schemeClr val="accent5">
+                    <a:lumMod val="75000"/>
                   </a:schemeClr>
                 </a:solidFill>
-                <a:latin typeface="Univers for UniS 65 Bold Rg" panose="020B0703030502020204"/>
-              </a:rPr>
-              <a:t>  a </a:t>
-            </a:r>
-            <a:r>
-              <a:rPr lang="de-DE" sz="6000" dirty="0" err="1">
-                <a:solidFill>
-                  <a:schemeClr val="tx1">
-                    <a:lumMod val="50000"/>
+              </a:rPr>
+              <a:t> </a:t>
+            </a:r>
+            <a:r>
+              <a:rPr lang="de-DE" sz="4400" dirty="0" err="1">
+                <a:solidFill>
+                  <a:schemeClr val="accent5">
+                    <a:lumMod val="75000"/>
                   </a:schemeClr>
                 </a:solidFill>
-                <a:latin typeface="Univers for UniS 65 Bold Rg" panose="020B0703030502020204"/>
-              </a:rPr>
-              <a:t>SysActionType</a:t>
-            </a:r>
-            <a:r>
-              <a:rPr lang="de-DE" sz="6000" dirty="0">
-                <a:solidFill>
-                  <a:schemeClr val="tx1">
-                    <a:lumMod val="50000"/>
-                  </a:schemeClr>
-                </a:solidFill>
-                <a:latin typeface="Univers for UniS 65 Bold Rg" panose="020B0703030502020204"/>
-              </a:rPr>
-              <a:t> with </a:t>
-            </a:r>
-            <a:r>
-              <a:rPr lang="de-DE" sz="6000" dirty="0" err="1">
-                <a:solidFill>
-                  <a:schemeClr val="tx1">
-                    <a:lumMod val="50000"/>
-                  </a:schemeClr>
-                </a:solidFill>
-                <a:latin typeface="Univers for UniS 65 Bold Rg" panose="020B0703030502020204"/>
-              </a:rPr>
-              <a:t>hard</a:t>
-            </a:r>
-            <a:r>
-              <a:rPr lang="de-DE" sz="6000" dirty="0">
-                <a:solidFill>
-                  <a:schemeClr val="tx1">
-                    <a:lumMod val="50000"/>
-                  </a:schemeClr>
-                </a:solidFill>
-                <a:latin typeface="Univers for UniS 65 Bold Rg" panose="020B0703030502020204"/>
-              </a:rPr>
-              <a:t> </a:t>
-            </a:r>
-            <a:r>
-              <a:rPr lang="de-DE" sz="6000" dirty="0" err="1">
-                <a:solidFill>
-                  <a:schemeClr val="tx1">
-                    <a:lumMod val="50000"/>
-                  </a:schemeClr>
-                </a:solidFill>
-                <a:latin typeface="Univers for UniS 65 Bold Rg" panose="020B0703030502020204"/>
-              </a:rPr>
-              <a:t>coded</a:t>
-            </a:r>
-            <a:r>
-              <a:rPr lang="de-DE" sz="6000" dirty="0">
-                <a:solidFill>
-                  <a:schemeClr val="tx1">
-                    <a:lumMod val="50000"/>
-                  </a:schemeClr>
-                </a:solidFill>
-                <a:latin typeface="Univers for UniS 65 Bold Rg" panose="020B0703030502020204"/>
-              </a:rPr>
-              <a:t> </a:t>
-            </a:r>
-            <a:r>
-              <a:rPr lang="de-DE" sz="6000" dirty="0" err="1">
-                <a:solidFill>
-                  <a:schemeClr val="tx1">
-                    <a:lumMod val="50000"/>
-                  </a:schemeClr>
-                </a:solidFill>
-                <a:latin typeface="Univers for UniS 65 Bold Rg" panose="020B0703030502020204"/>
-              </a:rPr>
-              <a:t>template</a:t>
-            </a:r>
-            <a:r>
-              <a:rPr lang="de-DE" sz="6000" dirty="0">
-                <a:solidFill>
-                  <a:schemeClr val="tx1">
-                    <a:lumMod val="50000"/>
-                  </a:schemeClr>
-                </a:solidFill>
-                <a:latin typeface="Univers for UniS 65 Bold Rg" panose="020B0703030502020204"/>
-              </a:rPr>
-              <a:t> </a:t>
-            </a:r>
-            <a:r>
-              <a:rPr lang="de-DE" sz="6000" dirty="0" err="1">
-                <a:solidFill>
-                  <a:schemeClr val="tx1">
-                    <a:lumMod val="50000"/>
-                  </a:schemeClr>
-                </a:solidFill>
-                <a:latin typeface="Univers for UniS 65 Bold Rg" panose="020B0703030502020204"/>
-              </a:rPr>
-              <a:t>opening</a:t>
-            </a:r>
-            <a:r>
-              <a:rPr lang="de-DE" sz="6000" dirty="0">
-                <a:solidFill>
-                  <a:schemeClr val="tx1">
-                    <a:lumMod val="50000"/>
-                  </a:schemeClr>
-                </a:solidFill>
-                <a:latin typeface="Univers for UniS 65 Bold Rg" panose="020B0703030502020204"/>
-              </a:rPr>
-              <a:t>(), </a:t>
-            </a:r>
-            <a:r>
-              <a:rPr lang="de-DE" sz="6000" dirty="0" err="1">
-                <a:solidFill>
-                  <a:schemeClr val="tx1">
-                    <a:lumMod val="50000"/>
-                  </a:schemeClr>
-                </a:solidFill>
-                <a:latin typeface="Univers for UniS 65 Bold Rg" panose="020B0703030502020204"/>
-              </a:rPr>
-              <a:t>containing</a:t>
-            </a:r>
-            <a:r>
-              <a:rPr lang="de-DE" sz="6000" dirty="0">
-                <a:solidFill>
-                  <a:schemeClr val="tx1">
-                    <a:lumMod val="50000"/>
-                  </a:schemeClr>
-                </a:solidFill>
-                <a:latin typeface="Univers for UniS 65 Bold Rg" panose="020B0703030502020204"/>
-              </a:rPr>
-              <a:t> all </a:t>
-            </a:r>
-            <a:r>
-              <a:rPr lang="de-DE" sz="6000" dirty="0" err="1">
-                <a:solidFill>
-                  <a:schemeClr val="tx1">
-                    <a:lumMod val="50000"/>
-                  </a:schemeClr>
-                </a:solidFill>
-                <a:latin typeface="Univers for UniS 65 Bold Rg" panose="020B0703030502020204"/>
-              </a:rPr>
-              <a:t>the</a:t>
-            </a:r>
-            <a:r>
-              <a:rPr lang="de-DE" sz="6000" dirty="0">
-                <a:solidFill>
-                  <a:schemeClr val="tx1">
-                    <a:lumMod val="50000"/>
-                  </a:schemeClr>
-                </a:solidFill>
-                <a:latin typeface="Univers for UniS 65 Bold Rg" panose="020B0703030502020204"/>
-              </a:rPr>
-              <a:t> </a:t>
-            </a:r>
-            <a:r>
-              <a:rPr lang="de-DE" sz="6000" dirty="0" err="1">
-                <a:solidFill>
-                  <a:schemeClr val="tx1">
-                    <a:lumMod val="50000"/>
-                  </a:schemeClr>
-                </a:solidFill>
-                <a:latin typeface="Univers for UniS 65 Bold Rg" panose="020B0703030502020204"/>
-              </a:rPr>
-              <a:t>information</a:t>
-            </a:r>
-            <a:endParaRPr lang="de-DE" sz="6000" dirty="0">
+              </a:rPr>
+              <a:t>elefant</a:t>
+            </a:r>
+            <a:endParaRPr lang="de-DE" sz="4400" dirty="0">
               <a:solidFill>
-                <a:schemeClr val="tx1">
-                  <a:lumMod val="50000"/>
+                <a:schemeClr val="accent5">
+                  <a:lumMod val="75000"/>
                 </a:schemeClr>
               </a:solidFill>
+            </a:endParaRPr>
+          </a:p>
+          <a:p>
+            <a:r>
+              <a:rPr lang="de-DE" sz="4400" dirty="0" err="1">
+                <a:solidFill>
+                  <a:srgbClr val="002060"/>
+                </a:solidFill>
+              </a:rPr>
+              <a:t>Which</a:t>
+            </a:r>
+            <a:r>
+              <a:rPr lang="de-DE" sz="4400" dirty="0">
+                <a:solidFill>
+                  <a:srgbClr val="002060"/>
+                </a:solidFill>
+              </a:rPr>
+              <a:t> </a:t>
+            </a:r>
+            <a:r>
+              <a:rPr lang="de-DE" sz="4400" dirty="0" err="1">
+                <a:solidFill>
+                  <a:srgbClr val="002060"/>
+                </a:solidFill>
+              </a:rPr>
+              <a:t>other</a:t>
+            </a:r>
+            <a:r>
+              <a:rPr lang="de-DE" sz="4400" dirty="0">
+                <a:solidFill>
+                  <a:srgbClr val="002060"/>
+                </a:solidFill>
+              </a:rPr>
+              <a:t> </a:t>
+            </a:r>
+            <a:r>
+              <a:rPr lang="de-DE" sz="4400" dirty="0" err="1">
+                <a:solidFill>
+                  <a:srgbClr val="002060"/>
+                </a:solidFill>
+              </a:rPr>
+              <a:t>animal</a:t>
+            </a:r>
+            <a:r>
+              <a:rPr lang="de-DE" sz="4400" dirty="0">
+                <a:solidFill>
+                  <a:srgbClr val="002060"/>
+                </a:solidFill>
+              </a:rPr>
+              <a:t> do you </a:t>
+            </a:r>
+            <a:r>
+              <a:rPr lang="de-DE" sz="4400" dirty="0" err="1">
+                <a:solidFill>
+                  <a:srgbClr val="002060"/>
+                </a:solidFill>
+              </a:rPr>
+              <a:t>want</a:t>
+            </a:r>
+            <a:r>
+              <a:rPr lang="de-DE" sz="4400" dirty="0">
+                <a:solidFill>
+                  <a:srgbClr val="002060"/>
+                </a:solidFill>
+              </a:rPr>
+              <a:t> to </a:t>
+            </a:r>
+            <a:r>
+              <a:rPr lang="de-DE" sz="4400" dirty="0" err="1">
+                <a:solidFill>
+                  <a:srgbClr val="002060"/>
+                </a:solidFill>
+              </a:rPr>
+              <a:t>visit</a:t>
+            </a:r>
+            <a:r>
+              <a:rPr lang="de-DE" sz="4400" dirty="0">
+                <a:solidFill>
+                  <a:srgbClr val="002060"/>
+                </a:solidFill>
+              </a:rPr>
+              <a:t>?</a:t>
+            </a:r>
+          </a:p>
+          <a:p>
+            <a:r>
+              <a:rPr lang="de-DE" sz="4400" dirty="0"/>
+              <a:t>	</a:t>
+            </a:r>
+            <a:r>
+              <a:rPr lang="de-DE" sz="4400" dirty="0">
+                <a:solidFill>
+                  <a:schemeClr val="accent5">
+                    <a:lumMod val="75000"/>
+                  </a:schemeClr>
+                </a:solidFill>
+              </a:rPr>
+              <a:t>The </a:t>
+            </a:r>
+            <a:r>
+              <a:rPr lang="de-DE" sz="4400" dirty="0" err="1">
+                <a:solidFill>
+                  <a:schemeClr val="accent5">
+                    <a:lumMod val="75000"/>
+                  </a:schemeClr>
+                </a:solidFill>
+              </a:rPr>
+              <a:t>penguin</a:t>
+            </a:r>
+            <a:r>
+              <a:rPr lang="de-DE" sz="4400" dirty="0">
+                <a:solidFill>
+                  <a:schemeClr val="accent5">
+                    <a:lumMod val="75000"/>
+                  </a:schemeClr>
+                </a:solidFill>
+              </a:rPr>
+              <a:t> and </a:t>
+            </a:r>
+            <a:r>
+              <a:rPr lang="de-DE" sz="4400" dirty="0" err="1">
+                <a:solidFill>
+                  <a:schemeClr val="accent5">
+                    <a:lumMod val="75000"/>
+                  </a:schemeClr>
+                </a:solidFill>
+              </a:rPr>
+              <a:t>the</a:t>
+            </a:r>
+            <a:r>
+              <a:rPr lang="de-DE" sz="4400" dirty="0">
+                <a:solidFill>
+                  <a:schemeClr val="accent5">
+                    <a:lumMod val="75000"/>
+                  </a:schemeClr>
+                </a:solidFill>
+              </a:rPr>
+              <a:t> </a:t>
+            </a:r>
+            <a:r>
+              <a:rPr lang="de-DE" sz="4400" dirty="0" err="1">
+                <a:solidFill>
+                  <a:schemeClr val="accent5">
+                    <a:lumMod val="75000"/>
+                  </a:schemeClr>
+                </a:solidFill>
+              </a:rPr>
+              <a:t>anaconda</a:t>
+            </a:r>
+            <a:endParaRPr lang="de-DE" sz="4400" dirty="0">
+              <a:solidFill>
+                <a:schemeClr val="accent5">
+                  <a:lumMod val="75000"/>
+                </a:schemeClr>
+              </a:solidFill>
+            </a:endParaRPr>
+          </a:p>
+          <a:p>
+            <a:r>
+              <a:rPr lang="en-US" sz="4400" dirty="0">
+                <a:solidFill>
+                  <a:srgbClr val="002060"/>
+                </a:solidFill>
+              </a:rPr>
+              <a:t>According to the feeding times, it would be best to first visit the green anaconda which is fed at 11:30 o'clock, then visit the </a:t>
+            </a:r>
+            <a:r>
+              <a:rPr lang="en-US" sz="4400" dirty="0" err="1">
+                <a:solidFill>
+                  <a:srgbClr val="002060"/>
+                </a:solidFill>
+              </a:rPr>
+              <a:t>asian</a:t>
+            </a:r>
+            <a:r>
+              <a:rPr lang="en-US" sz="4400" dirty="0">
+                <a:solidFill>
+                  <a:srgbClr val="002060"/>
+                </a:solidFill>
+              </a:rPr>
+              <a:t> </a:t>
+            </a:r>
+            <a:r>
+              <a:rPr lang="en-US" sz="4400" dirty="0" err="1">
+                <a:solidFill>
+                  <a:srgbClr val="002060"/>
+                </a:solidFill>
+              </a:rPr>
+              <a:t>elefant</a:t>
+            </a:r>
+            <a:r>
+              <a:rPr lang="en-US" sz="4400" dirty="0">
+                <a:solidFill>
+                  <a:srgbClr val="002060"/>
+                </a:solidFill>
+              </a:rPr>
+              <a:t> fed at 13:00 o'clock, and finally visit the </a:t>
+            </a:r>
+            <a:r>
+              <a:rPr lang="en-US" sz="4400" dirty="0" err="1">
+                <a:solidFill>
+                  <a:srgbClr val="002060"/>
+                </a:solidFill>
+              </a:rPr>
+              <a:t>african</a:t>
+            </a:r>
+            <a:r>
+              <a:rPr lang="en-US" sz="4400" dirty="0">
+                <a:solidFill>
+                  <a:srgbClr val="002060"/>
+                </a:solidFill>
+              </a:rPr>
+              <a:t> penguin to not miss its public feeding at 13:30 o'clock.</a:t>
+            </a:r>
+            <a:endParaRPr lang="de-DE" sz="4400" dirty="0">
+              <a:solidFill>
+                <a:srgbClr val="002060"/>
+              </a:solidFill>
+            </a:endParaRPr>
+          </a:p>
+          <a:p>
+            <a:endParaRPr lang="de-DE" sz="4000" dirty="0"/>
+          </a:p>
+          <a:p>
+            <a:pPr algn="just"/>
+            <a:r>
+              <a:rPr lang="en-US" sz="4400" dirty="0"/>
+              <a:t>function for recognizing three animals and checking their feeding times (</a:t>
+            </a:r>
+            <a:r>
+              <a:rPr lang="en-US" sz="4400" dirty="0" err="1"/>
+              <a:t>beliefstate</a:t>
+            </a:r>
+            <a:r>
+              <a:rPr lang="en-US" sz="4400" dirty="0"/>
+              <a:t>)</a:t>
+            </a:r>
+          </a:p>
+          <a:p>
+            <a:pPr algn="just"/>
+            <a:r>
+              <a:rPr lang="en-US" sz="4400" dirty="0"/>
+              <a:t>function to sort the feeding times and add the corresponding animal for the output (policy)</a:t>
+            </a:r>
+          </a:p>
+          <a:p>
+            <a:pPr algn="just"/>
+            <a:r>
+              <a:rPr lang="en-US" sz="4400" dirty="0"/>
+              <a:t>the values "none" or overlapping feeding times are considered</a:t>
+            </a:r>
+          </a:p>
+          <a:p>
+            <a:pPr algn="just"/>
+            <a:endParaRPr lang="de-DE" sz="4400" dirty="0"/>
+          </a:p>
+          <a:p>
+            <a:r>
+              <a:rPr lang="de-DE" sz="5400" b="1" dirty="0"/>
+              <a:t>Challenges </a:t>
+            </a:r>
+          </a:p>
+          <a:p>
+            <a:r>
+              <a:rPr lang="de-DE" sz="4400" b="1" dirty="0"/>
+              <a:t>…in </a:t>
+            </a:r>
+            <a:r>
+              <a:rPr lang="de-DE" sz="4400" b="1" dirty="0" err="1"/>
+              <a:t>the</a:t>
+            </a:r>
+            <a:r>
+              <a:rPr lang="de-DE" sz="4400" b="1" dirty="0"/>
+              <a:t> </a:t>
+            </a:r>
+            <a:r>
+              <a:rPr lang="de-DE" sz="4400" b="1" dirty="0" err="1"/>
+              <a:t>system</a:t>
+            </a:r>
+            <a:endParaRPr lang="de-DE" sz="4400" b="1" dirty="0"/>
+          </a:p>
+          <a:p>
+            <a:pPr marL="685800" indent="-685800">
+              <a:buFont typeface="Wingdings" panose="05000000000000000000" pitchFamily="2" charset="2"/>
+              <a:buChar char="Ø"/>
+            </a:pPr>
+            <a:r>
+              <a:rPr lang="en-US" sz="4400" dirty="0">
+                <a:effectLst/>
+                <a:latin typeface="Univers for UniS 65 Bold Rg" panose="020B0703030502020204"/>
+              </a:rPr>
+              <a:t>“Africa” appears both in </a:t>
+            </a:r>
+            <a:r>
+              <a:rPr lang="en-US" sz="4400" dirty="0" err="1">
+                <a:effectLst/>
+                <a:latin typeface="Univers for UniS 65 Bold Rg" panose="020B0703030502020204"/>
+              </a:rPr>
+              <a:t>continent_of_origin</a:t>
+            </a:r>
+            <a:r>
+              <a:rPr lang="en-US" sz="4400" dirty="0">
+                <a:effectLst/>
+                <a:latin typeface="Univers for UniS 65 Bold Rg" panose="020B0703030502020204"/>
+              </a:rPr>
+              <a:t> and in </a:t>
+            </a:r>
+            <a:r>
+              <a:rPr lang="en-US" sz="4400" dirty="0" err="1">
+                <a:effectLst/>
+                <a:latin typeface="Univers for UniS 65 Bold Rg" panose="020B0703030502020204"/>
+              </a:rPr>
+              <a:t>location_in_wihelma</a:t>
+            </a:r>
+            <a:endParaRPr lang="en-US" sz="4400" dirty="0">
               <a:effectLst/>
               <a:latin typeface="Univers for UniS 65 Bold Rg" panose="020B0703030502020204"/>
             </a:endParaRPr>
           </a:p>
           <a:p>
-            <a:endParaRPr lang="de-DE" sz="6000" dirty="0">
-              <a:solidFill>
-                <a:srgbClr val="BCBEC4"/>
-              </a:solidFill>
-              <a:effectLst/>
-              <a:latin typeface="JetBrains Mono"/>
-            </a:endParaRPr>
-          </a:p>
-          <a:p>
-            <a:r>
-              <a:rPr lang="de-DE" sz="6600" b="1" dirty="0"/>
-              <a:t>Challenges in </a:t>
-            </a:r>
-            <a:r>
-              <a:rPr lang="de-DE" sz="6600" b="1" dirty="0" err="1"/>
-              <a:t>the</a:t>
-            </a:r>
-            <a:r>
-              <a:rPr lang="de-DE" sz="6600" b="1" dirty="0"/>
-              <a:t> </a:t>
-            </a:r>
-            <a:r>
-              <a:rPr lang="de-DE" sz="6600" b="1" dirty="0" err="1"/>
-              <a:t>ontology</a:t>
-            </a:r>
-            <a:endParaRPr lang="de-DE" sz="6600" b="1" dirty="0"/>
-          </a:p>
-          <a:p>
-            <a:r>
-              <a:rPr lang="en-US" sz="6000" dirty="0">
-                <a:solidFill>
-                  <a:srgbClr val="002060"/>
-                </a:solidFill>
+            <a:pPr marL="685800" indent="-685800">
+              <a:buFont typeface="Wingdings" panose="05000000000000000000" pitchFamily="2" charset="2"/>
+              <a:buChar char="Ø"/>
+            </a:pPr>
+            <a:r>
+              <a:rPr lang="en-US" sz="4400" dirty="0">
                 <a:effectLst/>
                 <a:latin typeface="Univers for UniS 65 Bold Rg" panose="020B0703030502020204"/>
               </a:rPr>
-              <a:t>Origin: „African Continent“/“</a:t>
-            </a:r>
-            <a:r>
-              <a:rPr lang="en-US" sz="6000" dirty="0" err="1">
-                <a:solidFill>
-                  <a:srgbClr val="002060"/>
-                </a:solidFill>
+              <a:t>value for </a:t>
+            </a:r>
+            <a:r>
+              <a:rPr lang="en-US" sz="4400" dirty="0" err="1">
                 <a:effectLst/>
                 <a:latin typeface="Univers for UniS 65 Bold Rg" panose="020B0703030502020204"/>
               </a:rPr>
-              <a:t>african</a:t>
-            </a:r>
-            <a:r>
-              <a:rPr lang="en-US" sz="6000" dirty="0">
-                <a:solidFill>
-                  <a:srgbClr val="002060"/>
-                </a:solidFill>
+              <a:t>feeding_times</a:t>
+            </a:r>
+            <a:r>
+              <a:rPr lang="en-US" sz="4400" dirty="0">
                 <a:effectLst/>
                 <a:latin typeface="Univers for UniS 65 Bold Rg" panose="020B0703030502020204"/>
               </a:rPr>
-              <a:t>“</a:t>
-            </a:r>
-          </a:p>
-          <a:p>
-            <a:r>
-              <a:rPr lang="en-US" sz="6000" dirty="0">
-                <a:solidFill>
-                  <a:srgbClr val="002060"/>
-                </a:solidFill>
+              <a:t> can be the same for different animals</a:t>
+            </a:r>
+          </a:p>
+          <a:p>
+            <a:r>
+              <a:rPr lang="en-US" sz="4400" dirty="0">
+                <a:latin typeface="Univers for UniS 65 Bold Rg" panose="020B0703030502020204"/>
+              </a:rPr>
+              <a:t>… </a:t>
+            </a:r>
+            <a:r>
+              <a:rPr lang="en-US" sz="4400" b="1" dirty="0">
+                <a:latin typeface="Univers for UniS 65 Bold Rg" panose="020B0703030502020204"/>
+              </a:rPr>
+              <a:t>in the process</a:t>
+            </a:r>
+          </a:p>
+          <a:p>
+            <a:pPr marL="685800" indent="-685800">
+              <a:buFont typeface="Wingdings" panose="05000000000000000000" pitchFamily="2" charset="2"/>
+              <a:buChar char="Ø"/>
+            </a:pPr>
+            <a:r>
+              <a:rPr lang="en-US" sz="4400" dirty="0">
                 <a:effectLst/>
                 <a:latin typeface="Univers for UniS 65 Bold Rg" panose="020B0703030502020204"/>
               </a:rPr>
-              <a:t>Location: „</a:t>
-            </a:r>
-            <a:r>
-              <a:rPr lang="en-US" sz="6000" dirty="0" err="1">
-                <a:solidFill>
-                  <a:srgbClr val="002060"/>
-                </a:solidFill>
-                <a:effectLst/>
+              <a:t>tedious to keep track of all parts (files) while implementing new functions</a:t>
+            </a:r>
+          </a:p>
+          <a:p>
+            <a:pPr marL="685800" indent="-685800">
+              <a:buFont typeface="Wingdings" panose="05000000000000000000" pitchFamily="2" charset="2"/>
+              <a:buChar char="Ø"/>
+            </a:pPr>
+            <a:r>
+              <a:rPr lang="en-US" sz="4400" dirty="0">
                 <a:latin typeface="Univers for UniS 65 Bold Rg" panose="020B0703030502020204"/>
               </a:rPr>
-              <a:t>africa</a:t>
-            </a:r>
-            <a:r>
-              <a:rPr lang="en-US" sz="6000" dirty="0">
-                <a:solidFill>
-                  <a:srgbClr val="002060"/>
-                </a:solidFill>
-                <a:effectLst/>
-                <a:latin typeface="Univers for UniS 65 Bold Rg" panose="020B0703030502020204"/>
-              </a:rPr>
-              <a:t> house“/“</a:t>
-            </a:r>
-            <a:r>
-              <a:rPr lang="en-US" sz="6000" dirty="0" err="1">
-                <a:solidFill>
-                  <a:srgbClr val="002060"/>
-                </a:solidFill>
-                <a:effectLst/>
-                <a:latin typeface="Univers for UniS 65 Bold Rg" panose="020B0703030502020204"/>
-              </a:rPr>
-              <a:t>africa</a:t>
-            </a:r>
-            <a:r>
-              <a:rPr lang="en-US" sz="6000" dirty="0">
-                <a:solidFill>
-                  <a:srgbClr val="002060"/>
-                </a:solidFill>
-                <a:effectLst/>
-                <a:latin typeface="Univers for UniS 65 Bold Rg" panose="020B0703030502020204"/>
-              </a:rPr>
-              <a:t>-house“/“</a:t>
-            </a:r>
-            <a:r>
-              <a:rPr lang="en-US" sz="6000" dirty="0" err="1">
-                <a:solidFill>
-                  <a:srgbClr val="002060"/>
-                </a:solidFill>
-                <a:effectLst/>
-                <a:latin typeface="Univers for UniS 65 Bold Rg" panose="020B0703030502020204"/>
-              </a:rPr>
-              <a:t>africahouse</a:t>
-            </a:r>
-            <a:r>
-              <a:rPr lang="en-US" sz="6000" dirty="0">
-                <a:solidFill>
-                  <a:srgbClr val="002060"/>
-                </a:solidFill>
-                <a:effectLst/>
-                <a:latin typeface="Univers for UniS 65 Bold Rg" panose="020B0703030502020204"/>
-              </a:rPr>
-              <a:t>“</a:t>
-            </a:r>
-          </a:p>
-          <a:p>
-            <a:endParaRPr lang="en-US" sz="4800" b="1" dirty="0">
-              <a:solidFill>
-                <a:srgbClr val="002060"/>
-              </a:solidFill>
-              <a:latin typeface="JetBrains Mono"/>
-            </a:endParaRPr>
-          </a:p>
-          <a:p>
-            <a:r>
-              <a:rPr lang="de-DE" sz="6600" b="1" dirty="0"/>
-              <a:t>Future Work </a:t>
-            </a:r>
+              <a:t>linguistic abilities of the system</a:t>
+            </a:r>
+          </a:p>
+          <a:p>
+            <a:endParaRPr lang="de-DE" sz="4400" b="1" dirty="0"/>
+          </a:p>
+          <a:p>
+            <a:endParaRPr lang="de-DE" sz="5400" b="1" dirty="0"/>
           </a:p>
         </p:txBody>
       </p:sp>
@@ -3880,19 +4242,39 @@
           <a:p>
             <a:r>
               <a:rPr lang="de-DE" sz="3600" dirty="0"/>
-              <a:t>Linnet Moxon</a:t>
+              <a:t>Maximilian Schmidt</a:t>
             </a:r>
           </a:p>
           <a:p>
             <a:r>
               <a:rPr lang="de-DE" sz="3600" dirty="0"/>
-              <a:t>Miriam </a:t>
+              <a:t>Lindsey </a:t>
             </a:r>
             <a:r>
               <a:rPr lang="de-DE" sz="3600" dirty="0" err="1"/>
-              <a:t>Segiet</a:t>
+              <a:t>Vanderlyn</a:t>
             </a:r>
             <a:endParaRPr lang="de-DE" sz="3600" dirty="0"/>
+          </a:p>
+          <a:p>
+            <a:r>
+              <a:rPr lang="de-DE" sz="3600" dirty="0"/>
+              <a:t>Dirk Väth</a:t>
+            </a:r>
+          </a:p>
+          <a:p>
+            <a:r>
+              <a:rPr lang="de-DE" sz="3600" dirty="0"/>
+              <a:t>Prof. Dr. </a:t>
+            </a:r>
+            <a:r>
+              <a:rPr lang="de-DE" sz="3600" dirty="0" err="1"/>
+              <a:t>Thang</a:t>
+            </a:r>
+            <a:r>
+              <a:rPr lang="de-DE" sz="3600" dirty="0"/>
+              <a:t> Vu</a:t>
+            </a:r>
           </a:p>
         </p:txBody>
       </p:sp>
@@ -3911,16 +4293,205 @@
           <a:bodyPr/>
           <a:lstStyle/>
           <a:p>
-            <a:endParaRPr lang="de-DE"/>
+            <a:endParaRPr lang="de-DE" dirty="0"/>
           </a:p>
         </p:txBody>
       </p:sp>
+      <p:pic>
+        <p:nvPicPr>
+          <p:cNvPr id="23" name="Graphic 22" descr="Sign with solid fill">
+            <a:extLst>
+              <a:ext uri="{FF2B5EF4-FFF2-40B4-BE49-F238E27FC236}">
+                <a16:creationId xmlns:a16="http://schemas.microsoft.com/office/drawing/2014/main" id="{EDA6FB29-D0D3-DBC7-C133-2309593E73B1}"/>
+              </a:ext>
+            </a:extLst>
+          </p:cNvPr>
+          <p:cNvPicPr>
+            <a:picLocks noChangeAspect="1"/>
+          </p:cNvPicPr>
+          <p:nvPr/>
+        </p:nvPicPr>
+        <p:blipFill>
+          <a:blip r:embed="rId3">
+            <a:extLst>
+              <a:ext uri="{28A0092B-C50C-407E-A947-70E740481C1C}">
+                <a14:useLocalDpi xmlns:a14="http://schemas.microsoft.com/office/drawing/2010/main" val="0"/>
+              </a:ext>
+              <a:ext uri="{96DAC541-7B7A-43D3-8B79-37D633B846F1}">
+                <asvg:svgBlip xmlns:asvg="http://schemas.microsoft.com/office/drawing/2016/SVG/main" r:embed="rId4"/>
+              </a:ext>
+            </a:extLst>
+          </a:blip>
+          <a:stretch>
+            <a:fillRect/>
+          </a:stretch>
+        </p:blipFill>
+        <p:spPr>
+          <a:xfrm>
+            <a:off x="28169183" y="7499210"/>
+            <a:ext cx="1823486" cy="1823486"/>
+          </a:xfrm>
+          <a:prstGeom prst="rect">
+            <a:avLst/>
+          </a:prstGeom>
+        </p:spPr>
+      </p:pic>
+      <p:pic>
+        <p:nvPicPr>
+          <p:cNvPr id="24" name="Content Placeholder 4" descr="Route (Two Pins With A Path) outline">
+            <a:extLst>
+              <a:ext uri="{FF2B5EF4-FFF2-40B4-BE49-F238E27FC236}">
+                <a16:creationId xmlns:a16="http://schemas.microsoft.com/office/drawing/2014/main" id="{7818DD1B-D77B-17C3-C2E7-B1F5CCE80E9C}"/>
+              </a:ext>
+            </a:extLst>
+          </p:cNvPr>
+          <p:cNvPicPr>
+            <a:picLocks noChangeAspect="1"/>
+          </p:cNvPicPr>
+          <p:nvPr/>
+        </p:nvPicPr>
+        <p:blipFill>
+          <a:blip r:embed="rId5">
+            <a:extLst>
+              <a:ext uri="{28A0092B-C50C-407E-A947-70E740481C1C}">
+                <a14:useLocalDpi xmlns:a14="http://schemas.microsoft.com/office/drawing/2010/main" val="0"/>
+              </a:ext>
+              <a:ext uri="{96DAC541-7B7A-43D3-8B79-37D633B846F1}">
+                <asvg:svgBlip xmlns:asvg="http://schemas.microsoft.com/office/drawing/2016/SVG/main" r:embed="rId6"/>
+              </a:ext>
+            </a:extLst>
+          </a:blip>
+          <a:stretch>
+            <a:fillRect/>
+          </a:stretch>
+        </p:blipFill>
+        <p:spPr>
+          <a:xfrm>
+            <a:off x="29418481" y="8076968"/>
+            <a:ext cx="2435141" cy="2435141"/>
+          </a:xfrm>
+          <a:prstGeom prst="rect">
+            <a:avLst/>
+          </a:prstGeom>
+        </p:spPr>
+      </p:pic>
+      <p:pic>
+        <p:nvPicPr>
+          <p:cNvPr id="29" name="Graphic 28" descr="Penguin outline">
+            <a:extLst>
+              <a:ext uri="{FF2B5EF4-FFF2-40B4-BE49-F238E27FC236}">
+                <a16:creationId xmlns:a16="http://schemas.microsoft.com/office/drawing/2014/main" id="{D884D52C-1CB2-A1CA-6D45-C06D1A37361D}"/>
+              </a:ext>
+            </a:extLst>
+          </p:cNvPr>
+          <p:cNvPicPr>
+            <a:picLocks noChangeAspect="1"/>
+          </p:cNvPicPr>
+          <p:nvPr/>
+        </p:nvPicPr>
+        <p:blipFill>
+          <a:blip r:embed="rId7">
+            <a:extLst>
+              <a:ext uri="{96DAC541-7B7A-43D3-8B79-37D633B846F1}">
+                <asvg:svgBlip xmlns:asvg="http://schemas.microsoft.com/office/drawing/2016/SVG/main" r:embed="rId8"/>
+              </a:ext>
+            </a:extLst>
+          </a:blip>
+          <a:stretch>
+            <a:fillRect/>
+          </a:stretch>
+        </p:blipFill>
+        <p:spPr>
+          <a:xfrm flipH="1">
+            <a:off x="38279259" y="14254086"/>
+            <a:ext cx="1897359" cy="1897359"/>
+          </a:xfrm>
+          <a:prstGeom prst="rect">
+            <a:avLst/>
+          </a:prstGeom>
+        </p:spPr>
+      </p:pic>
+      <p:pic>
+        <p:nvPicPr>
+          <p:cNvPr id="31" name="Graphic 30" descr="Elephant with solid fill">
+            <a:extLst>
+              <a:ext uri="{FF2B5EF4-FFF2-40B4-BE49-F238E27FC236}">
+                <a16:creationId xmlns:a16="http://schemas.microsoft.com/office/drawing/2014/main" id="{5D8B88AE-8EA2-98AF-C9D4-325EBF435857}"/>
+              </a:ext>
+            </a:extLst>
+          </p:cNvPr>
+          <p:cNvPicPr>
+            <a:picLocks noChangeAspect="1"/>
+          </p:cNvPicPr>
+          <p:nvPr/>
+        </p:nvPicPr>
+        <p:blipFill>
+          <a:blip r:embed="rId9">
+            <a:extLst>
+              <a:ext uri="{96DAC541-7B7A-43D3-8B79-37D633B846F1}">
+                <asvg:svgBlip xmlns:asvg="http://schemas.microsoft.com/office/drawing/2016/SVG/main" r:embed="rId10"/>
+              </a:ext>
+            </a:extLst>
+          </a:blip>
+          <a:stretch>
+            <a:fillRect/>
+          </a:stretch>
+        </p:blipFill>
+        <p:spPr>
+          <a:xfrm>
+            <a:off x="38748663" y="12501950"/>
+            <a:ext cx="1897360" cy="1897360"/>
+          </a:xfrm>
+          <a:prstGeom prst="rect">
+            <a:avLst/>
+          </a:prstGeom>
+        </p:spPr>
+      </p:pic>
+      <p:pic>
+        <p:nvPicPr>
+          <p:cNvPr id="35" name="Graphic 34" descr="Snake outline">
+            <a:extLst>
+              <a:ext uri="{FF2B5EF4-FFF2-40B4-BE49-F238E27FC236}">
+                <a16:creationId xmlns:a16="http://schemas.microsoft.com/office/drawing/2014/main" id="{9191BE30-BB15-B0A0-D040-620DF10302DC}"/>
+              </a:ext>
+            </a:extLst>
+          </p:cNvPr>
+          <p:cNvPicPr>
+            <a:picLocks noChangeAspect="1"/>
+          </p:cNvPicPr>
+          <p:nvPr/>
+        </p:nvPicPr>
+        <p:blipFill>
+          <a:blip r:embed="rId11">
+            <a:extLst>
+              <a:ext uri="{28A0092B-C50C-407E-A947-70E740481C1C}">
+                <a14:useLocalDpi xmlns:a14="http://schemas.microsoft.com/office/drawing/2010/main" val="0"/>
+              </a:ext>
+              <a:ext uri="{96DAC541-7B7A-43D3-8B79-37D633B846F1}">
+                <asvg:svgBlip xmlns:asvg="http://schemas.microsoft.com/office/drawing/2016/SVG/main" r:embed="rId12"/>
+              </a:ext>
+            </a:extLst>
+          </a:blip>
+          <a:stretch>
+            <a:fillRect/>
+          </a:stretch>
+        </p:blipFill>
+        <p:spPr>
+          <a:xfrm>
+            <a:off x="36844610" y="12231170"/>
+            <a:ext cx="1897360" cy="1897360"/>
+          </a:xfrm>
+          <a:prstGeom prst="rect">
+            <a:avLst/>
+          </a:prstGeom>
+        </p:spPr>
+      </p:pic>
       <p:sp>
         <p:nvSpPr>
-          <p:cNvPr id="9" name="Bildplatzhalter 8">
+          <p:cNvPr id="53" name="Picture Placeholder 52">
             <a:extLst>
-              <a:ext uri="{C183D7F6-B498-43B3-948B-1728B52AA6E4}">
-                <adec:decorative xmlns:adec="http://schemas.microsoft.com/office/drawing/2017/decorative" val="1"/>
+              <a:ext uri="{FF2B5EF4-FFF2-40B4-BE49-F238E27FC236}">
+                <a16:creationId xmlns:a16="http://schemas.microsoft.com/office/drawing/2014/main" id="{FB91AACC-3DC2-3BCC-AE80-055767CDFBCE}"/>
               </a:ext>
             </a:extLst>
           </p:cNvPr>
@@ -3932,6 +4503,490 @@
           </p:nvPr>
         </p:nvSpPr>
         <p:spPr/>
+      </p:sp>
+      <p:pic>
+        <p:nvPicPr>
+          <p:cNvPr id="54" name="Graphic 53" descr="Sloth with solid fill">
+            <a:extLst>
+              <a:ext uri="{FF2B5EF4-FFF2-40B4-BE49-F238E27FC236}">
+                <a16:creationId xmlns:a16="http://schemas.microsoft.com/office/drawing/2014/main" id="{2BC656B8-60DE-A6C3-45DB-DA7F98AF030C}"/>
+              </a:ext>
+            </a:extLst>
+          </p:cNvPr>
+          <p:cNvPicPr>
+            <a:picLocks noChangeAspect="1"/>
+          </p:cNvPicPr>
+          <p:nvPr/>
+        </p:nvPicPr>
+        <p:blipFill>
+          <a:blip r:embed="rId13">
+            <a:extLst>
+              <a:ext uri="{28A0092B-C50C-407E-A947-70E740481C1C}">
+                <a14:useLocalDpi xmlns:a14="http://schemas.microsoft.com/office/drawing/2010/main" val="0"/>
+              </a:ext>
+              <a:ext uri="{96DAC541-7B7A-43D3-8B79-37D633B846F1}">
+                <asvg:svgBlip xmlns:asvg="http://schemas.microsoft.com/office/drawing/2016/SVG/main" r:embed="rId14"/>
+              </a:ext>
+            </a:extLst>
+          </a:blip>
+          <a:stretch>
+            <a:fillRect/>
+          </a:stretch>
+        </p:blipFill>
+        <p:spPr>
+          <a:xfrm>
+            <a:off x="11369472" y="11730072"/>
+            <a:ext cx="2033843" cy="2033843"/>
+          </a:xfrm>
+          <a:prstGeom prst="rect">
+            <a:avLst/>
+          </a:prstGeom>
+        </p:spPr>
+      </p:pic>
+      <p:pic>
+        <p:nvPicPr>
+          <p:cNvPr id="55" name="Graphic 54" descr="Plant outline">
+            <a:extLst>
+              <a:ext uri="{FF2B5EF4-FFF2-40B4-BE49-F238E27FC236}">
+                <a16:creationId xmlns:a16="http://schemas.microsoft.com/office/drawing/2014/main" id="{85012E8F-2362-1048-EE8C-C59AA13D7646}"/>
+              </a:ext>
+            </a:extLst>
+          </p:cNvPr>
+          <p:cNvPicPr>
+            <a:picLocks noChangeAspect="1"/>
+          </p:cNvPicPr>
+          <p:nvPr/>
+        </p:nvPicPr>
+        <p:blipFill>
+          <a:blip r:embed="rId15">
+            <a:extLst>
+              <a:ext uri="{28A0092B-C50C-407E-A947-70E740481C1C}">
+                <a14:useLocalDpi xmlns:a14="http://schemas.microsoft.com/office/drawing/2010/main" val="0"/>
+              </a:ext>
+              <a:ext uri="{96DAC541-7B7A-43D3-8B79-37D633B846F1}">
+                <asvg:svgBlip xmlns:asvg="http://schemas.microsoft.com/office/drawing/2016/SVG/main" r:embed="rId16"/>
+              </a:ext>
+            </a:extLst>
+          </a:blip>
+          <a:stretch>
+            <a:fillRect/>
+          </a:stretch>
+        </p:blipFill>
+        <p:spPr>
+          <a:xfrm>
+            <a:off x="13586771" y="12973406"/>
+            <a:ext cx="1148273" cy="1148273"/>
+          </a:xfrm>
+          <a:prstGeom prst="rect">
+            <a:avLst/>
+          </a:prstGeom>
+        </p:spPr>
+      </p:pic>
+      <p:pic>
+        <p:nvPicPr>
+          <p:cNvPr id="56" name="Graphic 55" descr="Earth globe: Americas with solid fill">
+            <a:extLst>
+              <a:ext uri="{FF2B5EF4-FFF2-40B4-BE49-F238E27FC236}">
+                <a16:creationId xmlns:a16="http://schemas.microsoft.com/office/drawing/2014/main" id="{4142E689-13CC-E0A4-5E94-16DC3BA0D593}"/>
+              </a:ext>
+            </a:extLst>
+          </p:cNvPr>
+          <p:cNvPicPr>
+            <a:picLocks noChangeAspect="1"/>
+          </p:cNvPicPr>
+          <p:nvPr/>
+        </p:nvPicPr>
+        <p:blipFill>
+          <a:blip r:embed="rId17">
+            <a:extLst>
+              <a:ext uri="{28A0092B-C50C-407E-A947-70E740481C1C}">
+                <a14:useLocalDpi xmlns:a14="http://schemas.microsoft.com/office/drawing/2010/main" val="0"/>
+              </a:ext>
+              <a:ext uri="{96DAC541-7B7A-43D3-8B79-37D633B846F1}">
+                <asvg:svgBlip xmlns:asvg="http://schemas.microsoft.com/office/drawing/2016/SVG/main" r:embed="rId18"/>
+              </a:ext>
+            </a:extLst>
+          </a:blip>
+          <a:stretch>
+            <a:fillRect/>
+          </a:stretch>
+        </p:blipFill>
+        <p:spPr>
+          <a:xfrm>
+            <a:off x="14063879" y="11235995"/>
+            <a:ext cx="1560972" cy="1560972"/>
+          </a:xfrm>
+          <a:prstGeom prst="rect">
+            <a:avLst/>
+          </a:prstGeom>
+        </p:spPr>
+      </p:pic>
+      <p:sp>
+        <p:nvSpPr>
+          <p:cNvPr id="59" name="TextBox 58">
+            <a:extLst>
+              <a:ext uri="{FF2B5EF4-FFF2-40B4-BE49-F238E27FC236}">
+                <a16:creationId xmlns:a16="http://schemas.microsoft.com/office/drawing/2014/main" id="{76584473-CD31-CCB4-2508-8175357FC454}"/>
+              </a:ext>
+            </a:extLst>
+          </p:cNvPr>
+          <p:cNvSpPr txBox="1"/>
+          <p:nvPr/>
+        </p:nvSpPr>
+        <p:spPr>
+          <a:xfrm>
+            <a:off x="29269737" y="23513190"/>
+            <a:ext cx="9126881" cy="3524042"/>
+          </a:xfrm>
+          <a:prstGeom prst="rect">
+            <a:avLst/>
+          </a:prstGeom>
+          <a:noFill/>
+        </p:spPr>
+        <p:txBody>
+          <a:bodyPr wrap="square" rtlCol="0">
+            <a:spAutoFit/>
+          </a:bodyPr>
+          <a:lstStyle/>
+          <a:p>
+            <a:r>
+              <a:rPr lang="de-DE" sz="5400" b="1" dirty="0">
+                <a:solidFill>
+                  <a:schemeClr val="accent3"/>
+                </a:solidFill>
+              </a:rPr>
+              <a:t>Future Work</a:t>
+            </a:r>
+          </a:p>
+          <a:p>
+            <a:pPr marL="571500" indent="-571500">
+              <a:buFont typeface="Wingdings" panose="05000000000000000000" pitchFamily="2" charset="2"/>
+              <a:buChar char="Ø"/>
+            </a:pPr>
+            <a:r>
+              <a:rPr lang="de-DE" sz="4400" dirty="0" err="1">
+                <a:solidFill>
+                  <a:schemeClr val="accent3"/>
+                </a:solidFill>
+              </a:rPr>
+              <a:t>machine</a:t>
+            </a:r>
+            <a:r>
+              <a:rPr lang="de-DE" sz="4400" dirty="0">
+                <a:solidFill>
+                  <a:schemeClr val="accent3"/>
+                </a:solidFill>
+              </a:rPr>
+              <a:t> </a:t>
+            </a:r>
+            <a:r>
+              <a:rPr lang="de-DE" sz="4400" dirty="0" err="1">
+                <a:solidFill>
+                  <a:schemeClr val="accent3"/>
+                </a:solidFill>
+              </a:rPr>
+              <a:t>learning</a:t>
+            </a:r>
+            <a:r>
+              <a:rPr lang="de-DE" sz="4400" dirty="0">
+                <a:solidFill>
+                  <a:schemeClr val="accent3"/>
+                </a:solidFill>
+              </a:rPr>
+              <a:t> </a:t>
+            </a:r>
+            <a:r>
+              <a:rPr lang="de-DE" sz="4400" dirty="0" err="1">
+                <a:solidFill>
+                  <a:schemeClr val="accent3"/>
+                </a:solidFill>
+              </a:rPr>
+              <a:t>approach</a:t>
+            </a:r>
+            <a:endParaRPr lang="de-DE" sz="4400" dirty="0">
+              <a:solidFill>
+                <a:schemeClr val="accent3"/>
+              </a:solidFill>
+            </a:endParaRPr>
+          </a:p>
+          <a:p>
+            <a:pPr marL="571500" indent="-571500">
+              <a:buFont typeface="Wingdings" panose="05000000000000000000" pitchFamily="2" charset="2"/>
+              <a:buChar char="Ø"/>
+            </a:pPr>
+            <a:r>
+              <a:rPr lang="de-DE" sz="4400" dirty="0" err="1">
+                <a:solidFill>
+                  <a:schemeClr val="accent3"/>
+                </a:solidFill>
+              </a:rPr>
+              <a:t>include</a:t>
+            </a:r>
+            <a:r>
+              <a:rPr lang="de-DE" sz="4400" dirty="0">
+                <a:solidFill>
+                  <a:schemeClr val="accent3"/>
+                </a:solidFill>
+              </a:rPr>
+              <a:t> park </a:t>
+            </a:r>
+            <a:r>
+              <a:rPr lang="de-DE" sz="4400" dirty="0" err="1">
+                <a:solidFill>
+                  <a:schemeClr val="accent3"/>
+                </a:solidFill>
+              </a:rPr>
+              <a:t>map</a:t>
+            </a:r>
+            <a:r>
+              <a:rPr lang="de-DE" sz="4400" dirty="0">
+                <a:solidFill>
+                  <a:schemeClr val="accent3"/>
+                </a:solidFill>
+              </a:rPr>
+              <a:t> for </a:t>
+            </a:r>
+            <a:r>
+              <a:rPr lang="de-DE" sz="4400" dirty="0" err="1">
+                <a:solidFill>
+                  <a:schemeClr val="accent3"/>
+                </a:solidFill>
+              </a:rPr>
+              <a:t>visiting</a:t>
+            </a:r>
+            <a:r>
+              <a:rPr lang="de-DE" sz="4400" dirty="0">
+                <a:solidFill>
+                  <a:schemeClr val="accent3"/>
+                </a:solidFill>
+              </a:rPr>
+              <a:t> </a:t>
+            </a:r>
+            <a:r>
+              <a:rPr lang="de-DE" sz="4400" dirty="0" err="1">
+                <a:solidFill>
+                  <a:schemeClr val="accent3"/>
+                </a:solidFill>
+              </a:rPr>
+              <a:t>path</a:t>
+            </a:r>
+            <a:r>
+              <a:rPr lang="de-DE" sz="4400" dirty="0">
+                <a:solidFill>
+                  <a:schemeClr val="accent3"/>
+                </a:solidFill>
+              </a:rPr>
+              <a:t> </a:t>
+            </a:r>
+          </a:p>
+          <a:p>
+            <a:endParaRPr lang="de-DE" dirty="0"/>
+          </a:p>
+        </p:txBody>
+      </p:sp>
+      <p:pic>
+        <p:nvPicPr>
+          <p:cNvPr id="60" name="Graphic 59" descr="Daily calendar outline">
+            <a:extLst>
+              <a:ext uri="{FF2B5EF4-FFF2-40B4-BE49-F238E27FC236}">
+                <a16:creationId xmlns:a16="http://schemas.microsoft.com/office/drawing/2014/main" id="{F5F62D51-28A6-3D10-606C-E7C9A5A8FB43}"/>
+              </a:ext>
+            </a:extLst>
+          </p:cNvPr>
+          <p:cNvPicPr>
+            <a:picLocks noChangeAspect="1"/>
+          </p:cNvPicPr>
+          <p:nvPr/>
+        </p:nvPicPr>
+        <p:blipFill>
+          <a:blip r:embed="rId19">
+            <a:extLst>
+              <a:ext uri="{28A0092B-C50C-407E-A947-70E740481C1C}">
+                <a14:useLocalDpi xmlns:a14="http://schemas.microsoft.com/office/drawing/2010/main" val="0"/>
+              </a:ext>
+              <a:ext uri="{96DAC541-7B7A-43D3-8B79-37D633B846F1}">
+                <asvg:svgBlip xmlns:asvg="http://schemas.microsoft.com/office/drawing/2016/SVG/main" r:embed="rId20"/>
+              </a:ext>
+            </a:extLst>
+          </a:blip>
+          <a:stretch>
+            <a:fillRect/>
+          </a:stretch>
+        </p:blipFill>
+        <p:spPr>
+          <a:xfrm>
+            <a:off x="10382161" y="23591104"/>
+            <a:ext cx="2463032" cy="2463032"/>
+          </a:xfrm>
+          <a:prstGeom prst="rect">
+            <a:avLst/>
+          </a:prstGeom>
+        </p:spPr>
+      </p:pic>
+      <p:sp>
+        <p:nvSpPr>
+          <p:cNvPr id="61" name="TextBox 60">
+            <a:extLst>
+              <a:ext uri="{FF2B5EF4-FFF2-40B4-BE49-F238E27FC236}">
+                <a16:creationId xmlns:a16="http://schemas.microsoft.com/office/drawing/2014/main" id="{2D20A8A7-A056-0301-4546-E9C24F262A71}"/>
+              </a:ext>
+            </a:extLst>
+          </p:cNvPr>
+          <p:cNvSpPr txBox="1"/>
+          <p:nvPr/>
+        </p:nvSpPr>
+        <p:spPr>
+          <a:xfrm>
+            <a:off x="17515830" y="23536783"/>
+            <a:ext cx="12525875" cy="2954655"/>
+          </a:xfrm>
+          <a:prstGeom prst="rect">
+            <a:avLst/>
+          </a:prstGeom>
+          <a:noFill/>
+        </p:spPr>
+        <p:txBody>
+          <a:bodyPr wrap="square" rtlCol="0">
+            <a:spAutoFit/>
+          </a:bodyPr>
+          <a:lstStyle/>
+          <a:p>
+            <a:r>
+              <a:rPr lang="de-DE" sz="5400" b="1" dirty="0" err="1">
+                <a:solidFill>
+                  <a:schemeClr val="accent3"/>
+                </a:solidFill>
+                <a:latin typeface="Univers for UniS 65 Bold Rg" panose="020B0703030502020204"/>
+              </a:rPr>
+              <a:t>Conclusion</a:t>
+            </a:r>
+            <a:r>
+              <a:rPr lang="de-DE" sz="5400" b="1" dirty="0">
+                <a:solidFill>
+                  <a:schemeClr val="accent3"/>
+                </a:solidFill>
+                <a:latin typeface="Univers for UniS 65 Bold Rg" panose="020B0703030502020204"/>
+              </a:rPr>
+              <a:t> </a:t>
+            </a:r>
+          </a:p>
+          <a:p>
+            <a:pPr marL="685800" indent="-685800">
+              <a:buFont typeface="Wingdings" panose="05000000000000000000" pitchFamily="2" charset="2"/>
+              <a:buChar char="Ø"/>
+            </a:pPr>
+            <a:r>
+              <a:rPr lang="de-DE" sz="4400" dirty="0">
+                <a:solidFill>
+                  <a:schemeClr val="accent3"/>
+                </a:solidFill>
+              </a:rPr>
+              <a:t>possible to get </a:t>
+            </a:r>
+            <a:r>
+              <a:rPr lang="de-DE" sz="4400" dirty="0" err="1">
+                <a:solidFill>
+                  <a:schemeClr val="accent3"/>
+                </a:solidFill>
+              </a:rPr>
+              <a:t>information</a:t>
+            </a:r>
+            <a:endParaRPr lang="de-DE" sz="4400" dirty="0">
+              <a:solidFill>
+                <a:schemeClr val="accent3"/>
+              </a:solidFill>
+            </a:endParaRPr>
+          </a:p>
+          <a:p>
+            <a:pPr marL="685800" indent="-685800">
+              <a:buFont typeface="Wingdings" panose="05000000000000000000" pitchFamily="2" charset="2"/>
+              <a:buChar char="Ø"/>
+            </a:pPr>
+            <a:r>
+              <a:rPr lang="de-DE" sz="4400" dirty="0">
+                <a:solidFill>
+                  <a:schemeClr val="accent3"/>
+                </a:solidFill>
+              </a:rPr>
+              <a:t>not </a:t>
+            </a:r>
+            <a:r>
+              <a:rPr lang="de-DE" sz="4400" dirty="0" err="1">
+                <a:solidFill>
+                  <a:schemeClr val="accent3"/>
+                </a:solidFill>
+              </a:rPr>
+              <a:t>completely</a:t>
+            </a:r>
+            <a:r>
+              <a:rPr lang="de-DE" sz="4400" dirty="0">
+                <a:solidFill>
+                  <a:schemeClr val="accent3"/>
+                </a:solidFill>
+              </a:rPr>
+              <a:t> </a:t>
+            </a:r>
+            <a:r>
+              <a:rPr lang="de-DE" sz="4400" dirty="0" err="1">
+                <a:solidFill>
+                  <a:schemeClr val="accent3"/>
+                </a:solidFill>
+              </a:rPr>
+              <a:t>based</a:t>
+            </a:r>
+            <a:r>
+              <a:rPr lang="de-DE" sz="4400" dirty="0">
+                <a:solidFill>
+                  <a:schemeClr val="accent3"/>
+                </a:solidFill>
+              </a:rPr>
+              <a:t> on real </a:t>
+            </a:r>
+            <a:r>
+              <a:rPr lang="de-DE" sz="4400" dirty="0" err="1">
+                <a:solidFill>
+                  <a:schemeClr val="accent3"/>
+                </a:solidFill>
+              </a:rPr>
+              <a:t>information</a:t>
+            </a:r>
+            <a:endParaRPr lang="de-DE" sz="4400" dirty="0">
+              <a:solidFill>
+                <a:schemeClr val="accent3"/>
+              </a:solidFill>
+            </a:endParaRPr>
+          </a:p>
+          <a:p>
+            <a:pPr marL="685800" indent="-685800">
+              <a:buFont typeface="Wingdings" panose="05000000000000000000" pitchFamily="2" charset="2"/>
+              <a:buChar char="Ø"/>
+            </a:pPr>
+            <a:r>
+              <a:rPr lang="de-DE" sz="4400" dirty="0">
+                <a:solidFill>
+                  <a:schemeClr val="accent3"/>
+                </a:solidFill>
+              </a:rPr>
+              <a:t>you have to know what you </a:t>
+            </a:r>
+            <a:r>
+              <a:rPr lang="de-DE" sz="4400" dirty="0" err="1">
+                <a:solidFill>
+                  <a:schemeClr val="accent3"/>
+                </a:solidFill>
+              </a:rPr>
+              <a:t>ask</a:t>
+            </a:r>
+            <a:r>
+              <a:rPr lang="de-DE" sz="4400" dirty="0">
+                <a:solidFill>
+                  <a:schemeClr val="accent3"/>
+                </a:solidFill>
+              </a:rPr>
+              <a:t> for</a:t>
+            </a:r>
+          </a:p>
+        </p:txBody>
       </p:sp>
     </p:spTree>
     <p:extLst>

</xml_diff>